<commit_message>
update df model to add geo dimensions
</commit_message>
<xml_diff>
--- a/df-model/df-model.pptx
+++ b/df-model/df-model.pptx
@@ -243,7 +243,7 @@
           <a:p>
             <a:fld id="{E90F2C70-D7C5-4A11-BAB2-648D55629A91}" type="datetimeFigureOut">
               <a:rPr lang="fr-FR" smtClean="0"/>
-              <a:t>17/10/2017</a:t>
+              <a:t>21/10/2017</a:t>
             </a:fld>
             <a:endParaRPr lang="fr-FR"/>
           </a:p>
@@ -413,7 +413,7 @@
           <a:p>
             <a:fld id="{E90F2C70-D7C5-4A11-BAB2-648D55629A91}" type="datetimeFigureOut">
               <a:rPr lang="fr-FR" smtClean="0"/>
-              <a:t>17/10/2017</a:t>
+              <a:t>21/10/2017</a:t>
             </a:fld>
             <a:endParaRPr lang="fr-FR"/>
           </a:p>
@@ -593,7 +593,7 @@
           <a:p>
             <a:fld id="{E90F2C70-D7C5-4A11-BAB2-648D55629A91}" type="datetimeFigureOut">
               <a:rPr lang="fr-FR" smtClean="0"/>
-              <a:t>17/10/2017</a:t>
+              <a:t>21/10/2017</a:t>
             </a:fld>
             <a:endParaRPr lang="fr-FR"/>
           </a:p>
@@ -763,7 +763,7 @@
           <a:p>
             <a:fld id="{E90F2C70-D7C5-4A11-BAB2-648D55629A91}" type="datetimeFigureOut">
               <a:rPr lang="fr-FR" smtClean="0"/>
-              <a:t>17/10/2017</a:t>
+              <a:t>21/10/2017</a:t>
             </a:fld>
             <a:endParaRPr lang="fr-FR"/>
           </a:p>
@@ -1009,7 +1009,7 @@
           <a:p>
             <a:fld id="{E90F2C70-D7C5-4A11-BAB2-648D55629A91}" type="datetimeFigureOut">
               <a:rPr lang="fr-FR" smtClean="0"/>
-              <a:t>17/10/2017</a:t>
+              <a:t>21/10/2017</a:t>
             </a:fld>
             <a:endParaRPr lang="fr-FR"/>
           </a:p>
@@ -1241,7 +1241,7 @@
           <a:p>
             <a:fld id="{E90F2C70-D7C5-4A11-BAB2-648D55629A91}" type="datetimeFigureOut">
               <a:rPr lang="fr-FR" smtClean="0"/>
-              <a:t>17/10/2017</a:t>
+              <a:t>21/10/2017</a:t>
             </a:fld>
             <a:endParaRPr lang="fr-FR"/>
           </a:p>
@@ -1608,7 +1608,7 @@
           <a:p>
             <a:fld id="{E90F2C70-D7C5-4A11-BAB2-648D55629A91}" type="datetimeFigureOut">
               <a:rPr lang="fr-FR" smtClean="0"/>
-              <a:t>17/10/2017</a:t>
+              <a:t>21/10/2017</a:t>
             </a:fld>
             <a:endParaRPr lang="fr-FR"/>
           </a:p>
@@ -1726,7 +1726,7 @@
           <a:p>
             <a:fld id="{E90F2C70-D7C5-4A11-BAB2-648D55629A91}" type="datetimeFigureOut">
               <a:rPr lang="fr-FR" smtClean="0"/>
-              <a:t>17/10/2017</a:t>
+              <a:t>21/10/2017</a:t>
             </a:fld>
             <a:endParaRPr lang="fr-FR"/>
           </a:p>
@@ -1821,7 +1821,7 @@
           <a:p>
             <a:fld id="{E90F2C70-D7C5-4A11-BAB2-648D55629A91}" type="datetimeFigureOut">
               <a:rPr lang="fr-FR" smtClean="0"/>
-              <a:t>17/10/2017</a:t>
+              <a:t>21/10/2017</a:t>
             </a:fld>
             <a:endParaRPr lang="fr-FR"/>
           </a:p>
@@ -2098,7 +2098,7 @@
           <a:p>
             <a:fld id="{E90F2C70-D7C5-4A11-BAB2-648D55629A91}" type="datetimeFigureOut">
               <a:rPr lang="fr-FR" smtClean="0"/>
-              <a:t>17/10/2017</a:t>
+              <a:t>21/10/2017</a:t>
             </a:fld>
             <a:endParaRPr lang="fr-FR"/>
           </a:p>
@@ -2351,7 +2351,7 @@
           <a:p>
             <a:fld id="{E90F2C70-D7C5-4A11-BAB2-648D55629A91}" type="datetimeFigureOut">
               <a:rPr lang="fr-FR" smtClean="0"/>
-              <a:t>17/10/2017</a:t>
+              <a:t>21/10/2017</a:t>
             </a:fld>
             <a:endParaRPr lang="fr-FR"/>
           </a:p>
@@ -2564,7 +2564,7 @@
           <a:p>
             <a:fld id="{E90F2C70-D7C5-4A11-BAB2-648D55629A91}" type="datetimeFigureOut">
               <a:rPr lang="fr-FR" smtClean="0"/>
-              <a:t>17/10/2017</a:t>
+              <a:t>21/10/2017</a:t>
             </a:fld>
             <a:endParaRPr lang="fr-FR"/>
           </a:p>
@@ -2977,7 +2977,7 @@
         </p:nvSpPr>
         <p:spPr>
           <a:xfrm>
-            <a:off x="3048000" y="1997526"/>
+            <a:off x="4591050" y="2654316"/>
             <a:ext cx="2895600" cy="2946400"/>
           </a:xfrm>
           <a:prstGeom prst="rect">
@@ -3021,7 +3021,7 @@
         </p:nvSpPr>
         <p:spPr>
           <a:xfrm>
-            <a:off x="3957832" y="2226126"/>
+            <a:off x="5500882" y="2882916"/>
             <a:ext cx="1075936" cy="369332"/>
           </a:xfrm>
           <a:prstGeom prst="rect">
@@ -3051,7 +3051,7 @@
         </p:nvCxnSpPr>
         <p:spPr>
           <a:xfrm>
-            <a:off x="3048000" y="2722458"/>
+            <a:off x="4591050" y="3379248"/>
             <a:ext cx="2895600" cy="0"/>
           </a:xfrm>
           <a:prstGeom prst="line">
@@ -3086,7 +3086,7 @@
         </p:nvSpPr>
         <p:spPr>
           <a:xfrm>
-            <a:off x="3242796" y="3094528"/>
+            <a:off x="4785846" y="3751318"/>
             <a:ext cx="2305631" cy="1754326"/>
           </a:xfrm>
           <a:prstGeom prst="rect">
@@ -3114,11 +3114,7 @@
             </a:r>
             <a:r>
               <a:rPr lang="fr-FR" dirty="0" smtClean="0"/>
-              <a:t> </a:t>
-            </a:r>
-            <a:r>
-              <a:rPr lang="fr-FR" dirty="0" smtClean="0"/>
-              <a:t>(</a:t>
+              <a:t> (</a:t>
             </a:r>
             <a:r>
               <a:rPr lang="fr-FR" dirty="0" err="1" smtClean="0"/>
@@ -3154,7 +3150,6 @@
               <a:rPr lang="fr-FR" dirty="0" smtClean="0"/>
               <a:t>)</a:t>
             </a:r>
-            <a:endParaRPr lang="fr-FR" dirty="0" smtClean="0"/>
           </a:p>
           <a:p>
             <a:pPr marL="285750" indent="-285750">
@@ -3171,11 +3166,7 @@
             </a:r>
             <a:r>
               <a:rPr lang="fr-FR" dirty="0" smtClean="0"/>
-              <a:t> </a:t>
-            </a:r>
-            <a:r>
-              <a:rPr lang="fr-FR" dirty="0" smtClean="0"/>
-              <a:t>(</a:t>
+              <a:t> (</a:t>
             </a:r>
             <a:r>
               <a:rPr lang="fr-FR" dirty="0" err="1" smtClean="0"/>
@@ -3201,11 +3192,7 @@
             </a:r>
             <a:r>
               <a:rPr lang="fr-FR" dirty="0" smtClean="0"/>
-              <a:t> </a:t>
-            </a:r>
-            <a:r>
-              <a:rPr lang="fr-FR" dirty="0" smtClean="0"/>
-              <a:t>(</a:t>
+              <a:t> (</a:t>
             </a:r>
             <a:r>
               <a:rPr lang="fr-FR" dirty="0" err="1" smtClean="0"/>
@@ -3231,11 +3218,7 @@
             </a:r>
             <a:r>
               <a:rPr lang="fr-FR" dirty="0" smtClean="0"/>
-              <a:t> </a:t>
-            </a:r>
-            <a:r>
-              <a:rPr lang="fr-FR" dirty="0" smtClean="0"/>
-              <a:t>(</a:t>
+              <a:t> (</a:t>
             </a:r>
             <a:r>
               <a:rPr lang="fr-FR" dirty="0" err="1" smtClean="0"/>
@@ -3261,11 +3244,7 @@
             </a:r>
             <a:r>
               <a:rPr lang="fr-FR" dirty="0" smtClean="0"/>
-              <a:t> </a:t>
-            </a:r>
-            <a:r>
-              <a:rPr lang="fr-FR" dirty="0" smtClean="0"/>
-              <a:t>(</a:t>
+              <a:t> (</a:t>
             </a:r>
             <a:r>
               <a:rPr lang="fr-FR" dirty="0" err="1" smtClean="0"/>
@@ -3287,7 +3266,7 @@
         </p:nvCxnSpPr>
         <p:spPr>
           <a:xfrm>
-            <a:off x="2538186" y="2939390"/>
+            <a:off x="4081236" y="3596180"/>
             <a:ext cx="495300" cy="0"/>
           </a:xfrm>
           <a:prstGeom prst="line">
@@ -3322,7 +3301,7 @@
         </p:nvSpPr>
         <p:spPr>
           <a:xfrm>
-            <a:off x="2285218" y="2812906"/>
+            <a:off x="3828268" y="3469696"/>
             <a:ext cx="252968" cy="252968"/>
           </a:xfrm>
           <a:prstGeom prst="ellipse">
@@ -3362,7 +3341,7 @@
         </p:nvSpPr>
         <p:spPr>
           <a:xfrm>
-            <a:off x="1643517" y="2722458"/>
+            <a:off x="3186567" y="3379248"/>
             <a:ext cx="699872" cy="369332"/>
           </a:xfrm>
           <a:prstGeom prst="rect">
@@ -3392,7 +3371,7 @@
         </p:nvCxnSpPr>
         <p:spPr>
           <a:xfrm>
-            <a:off x="5943600" y="3155290"/>
+            <a:off x="7486650" y="4193080"/>
             <a:ext cx="495300" cy="0"/>
           </a:xfrm>
           <a:prstGeom prst="line">
@@ -3427,7 +3406,7 @@
         </p:nvSpPr>
         <p:spPr>
           <a:xfrm>
-            <a:off x="6438900" y="3028806"/>
+            <a:off x="7981950" y="4066596"/>
             <a:ext cx="252968" cy="252968"/>
           </a:xfrm>
           <a:prstGeom prst="ellipse">
@@ -3470,7 +3449,7 @@
         </p:nvSpPr>
         <p:spPr>
           <a:xfrm>
-            <a:off x="6668970" y="2932524"/>
+            <a:off x="8212020" y="3970314"/>
             <a:ext cx="581698" cy="369332"/>
           </a:xfrm>
           <a:prstGeom prst="rect">
@@ -3500,7 +3479,7 @@
         </p:nvCxnSpPr>
         <p:spPr>
           <a:xfrm>
-            <a:off x="5943600" y="3551569"/>
+            <a:off x="7486650" y="4589359"/>
             <a:ext cx="495300" cy="0"/>
           </a:xfrm>
           <a:prstGeom prst="line">
@@ -3535,7 +3514,7 @@
         </p:nvSpPr>
         <p:spPr>
           <a:xfrm>
-            <a:off x="6438900" y="3425085"/>
+            <a:off x="7981950" y="4462875"/>
             <a:ext cx="252968" cy="252968"/>
           </a:xfrm>
           <a:prstGeom prst="ellipse">
@@ -3578,7 +3557,7 @@
         </p:nvSpPr>
         <p:spPr>
           <a:xfrm>
-            <a:off x="6668970" y="3328803"/>
+            <a:off x="8212020" y="4366593"/>
             <a:ext cx="689612" cy="369332"/>
           </a:xfrm>
           <a:prstGeom prst="rect">
@@ -3608,7 +3587,7 @@
         </p:nvCxnSpPr>
         <p:spPr>
           <a:xfrm>
-            <a:off x="5943600" y="3997457"/>
+            <a:off x="7486650" y="5035247"/>
             <a:ext cx="495300" cy="0"/>
           </a:xfrm>
           <a:prstGeom prst="line">
@@ -3643,7 +3622,7 @@
         </p:nvSpPr>
         <p:spPr>
           <a:xfrm>
-            <a:off x="6438900" y="3870973"/>
+            <a:off x="7981950" y="4908763"/>
             <a:ext cx="252968" cy="252968"/>
           </a:xfrm>
           <a:prstGeom prst="ellipse">
@@ -3686,7 +3665,7 @@
         </p:nvSpPr>
         <p:spPr>
           <a:xfrm>
-            <a:off x="6668970" y="3774691"/>
+            <a:off x="8212020" y="4812481"/>
             <a:ext cx="698909" cy="369332"/>
           </a:xfrm>
           <a:prstGeom prst="rect">
@@ -3716,7 +3695,7 @@
         </p:nvCxnSpPr>
         <p:spPr>
           <a:xfrm>
-            <a:off x="5943600" y="4398059"/>
+            <a:off x="7486650" y="5435849"/>
             <a:ext cx="495300" cy="0"/>
           </a:xfrm>
           <a:prstGeom prst="line">
@@ -3751,7 +3730,7 @@
         </p:nvSpPr>
         <p:spPr>
           <a:xfrm>
-            <a:off x="6438900" y="4271575"/>
+            <a:off x="7981950" y="5309365"/>
             <a:ext cx="252968" cy="252968"/>
           </a:xfrm>
           <a:prstGeom prst="ellipse">
@@ -3794,7 +3773,7 @@
         </p:nvSpPr>
         <p:spPr>
           <a:xfrm>
-            <a:off x="6668970" y="4175293"/>
+            <a:off x="8212020" y="5213083"/>
             <a:ext cx="766748" cy="369332"/>
           </a:xfrm>
           <a:prstGeom prst="rect">
@@ -3818,13 +3797,13 @@
       </p:sp>
       <p:sp>
         <p:nvSpPr>
-          <p:cNvPr id="46" name="Ellipse 45"/>
+          <p:cNvPr id="62" name="Ellipse 61"/>
           <p:cNvSpPr/>
           <p:nvPr/>
         </p:nvSpPr>
         <p:spPr>
-          <a:xfrm>
-            <a:off x="2976887" y="1243822"/>
+          <a:xfrm rot="5400000">
+            <a:off x="8011666" y="2985213"/>
             <a:ext cx="252968" cy="252968"/>
           </a:xfrm>
           <a:prstGeom prst="ellipse">
@@ -3861,14 +3840,14 @@
       </p:sp>
       <p:sp>
         <p:nvSpPr>
-          <p:cNvPr id="47" name="ZoneTexte 46"/>
+          <p:cNvPr id="63" name="ZoneTexte 62"/>
           <p:cNvSpPr txBox="1"/>
           <p:nvPr/>
         </p:nvSpPr>
         <p:spPr>
           <a:xfrm>
-            <a:off x="3229855" y="1175680"/>
-            <a:ext cx="937244" cy="369332"/>
+            <a:off x="7766046" y="2594806"/>
+            <a:ext cx="867545" cy="369332"/>
           </a:xfrm>
           <a:prstGeom prst="rect">
             <a:avLst/>
@@ -3882,8 +3861,8 @@
           <a:lstStyle/>
           <a:p>
             <a:r>
-              <a:rPr lang="fr-FR" dirty="0" smtClean="0"/>
-              <a:t>location</a:t>
+              <a:rPr lang="fr-FR" dirty="0" err="1" smtClean="0"/>
+              <a:t>species</a:t>
             </a:r>
             <a:endParaRPr lang="fr-FR" dirty="0"/>
           </a:p>
@@ -3891,13 +3870,13 @@
       </p:sp>
       <p:cxnSp>
         <p:nvCxnSpPr>
-          <p:cNvPr id="48" name="Connecteur droit 47"/>
+          <p:cNvPr id="64" name="Connecteur droit 63"/>
           <p:cNvCxnSpPr/>
           <p:nvPr/>
         </p:nvCxnSpPr>
         <p:spPr>
-          <a:xfrm rot="2700000">
-            <a:off x="2616033" y="1115755"/>
+          <a:xfrm rot="10800000">
+            <a:off x="7501164" y="3111456"/>
             <a:ext cx="495300" cy="0"/>
           </a:xfrm>
           <a:prstGeom prst="line">
@@ -3926,13 +3905,13 @@
       </p:cxnSp>
       <p:sp>
         <p:nvSpPr>
-          <p:cNvPr id="49" name="Ellipse 48"/>
+          <p:cNvPr id="65" name="Ellipse 64"/>
           <p:cNvSpPr/>
           <p:nvPr/>
         </p:nvSpPr>
         <p:spPr>
-          <a:xfrm>
-            <a:off x="2471172" y="713000"/>
+          <a:xfrm rot="5400000">
+            <a:off x="8755618" y="2963839"/>
             <a:ext cx="252968" cy="252968"/>
           </a:xfrm>
           <a:prstGeom prst="ellipse">
@@ -3967,45 +3946,15 @@
           </a:p>
         </p:txBody>
       </p:sp>
-      <p:sp>
-        <p:nvSpPr>
-          <p:cNvPr id="50" name="ZoneTexte 49"/>
-          <p:cNvSpPr txBox="1"/>
-          <p:nvPr/>
-        </p:nvSpPr>
-        <p:spPr>
-          <a:xfrm>
-            <a:off x="1273566" y="622160"/>
-            <a:ext cx="1288814" cy="369332"/>
-          </a:xfrm>
-          <a:prstGeom prst="rect">
-            <a:avLst/>
-          </a:prstGeom>
-          <a:noFill/>
-        </p:spPr>
-        <p:txBody>
-          <a:bodyPr wrap="none" rtlCol="0">
-            <a:spAutoFit/>
-          </a:bodyPr>
-          <a:lstStyle/>
-          <a:p>
-            <a:r>
-              <a:rPr lang="fr-FR" dirty="0" err="1" smtClean="0"/>
-              <a:t>parentCode</a:t>
-            </a:r>
-            <a:endParaRPr lang="fr-FR" dirty="0" smtClean="0"/>
-          </a:p>
-        </p:txBody>
-      </p:sp>
       <p:cxnSp>
         <p:nvCxnSpPr>
-          <p:cNvPr id="51" name="Connecteur droit 50"/>
+          <p:cNvPr id="66" name="Connecteur droit 65"/>
           <p:cNvCxnSpPr/>
           <p:nvPr/>
         </p:nvCxnSpPr>
         <p:spPr>
-          <a:xfrm rot="2700000">
-            <a:off x="2101522" y="568285"/>
+          <a:xfrm rot="10800000">
+            <a:off x="8255219" y="3110910"/>
             <a:ext cx="495300" cy="0"/>
           </a:xfrm>
           <a:prstGeom prst="line">
@@ -4034,21 +3983,83 @@
       </p:cxnSp>
       <p:sp>
         <p:nvSpPr>
-          <p:cNvPr id="52" name="Ellipse 51"/>
+          <p:cNvPr id="67" name="ZoneTexte 66"/>
+          <p:cNvSpPr txBox="1"/>
+          <p:nvPr/>
+        </p:nvSpPr>
+        <p:spPr>
+          <a:xfrm>
+            <a:off x="8970486" y="2882037"/>
+            <a:ext cx="740587" cy="369332"/>
+          </a:xfrm>
+          <a:prstGeom prst="rect">
+            <a:avLst/>
+          </a:prstGeom>
+          <a:noFill/>
+        </p:spPr>
+        <p:txBody>
+          <a:bodyPr wrap="none" rtlCol="0">
+            <a:spAutoFit/>
+          </a:bodyPr>
+          <a:lstStyle/>
+          <a:p>
+            <a:r>
+              <a:rPr lang="fr-FR" dirty="0" err="1" smtClean="0"/>
+              <a:t>genus</a:t>
+            </a:r>
+            <a:endParaRPr lang="fr-FR" dirty="0"/>
+          </a:p>
+        </p:txBody>
+      </p:sp>
+      <p:cxnSp>
+        <p:nvCxnSpPr>
+          <p:cNvPr id="68" name="Connecteur droit 67"/>
+          <p:cNvCxnSpPr/>
+          <p:nvPr/>
+        </p:nvCxnSpPr>
+        <p:spPr>
+          <a:xfrm>
+            <a:off x="4104618" y="3985593"/>
+            <a:ext cx="495300" cy="0"/>
+          </a:xfrm>
+          <a:prstGeom prst="line">
+            <a:avLst/>
+          </a:prstGeom>
+          <a:ln>
+            <a:solidFill>
+              <a:schemeClr val="tx1"/>
+            </a:solidFill>
+          </a:ln>
+        </p:spPr>
+        <p:style>
+          <a:lnRef idx="1">
+            <a:schemeClr val="accent1"/>
+          </a:lnRef>
+          <a:fillRef idx="0">
+            <a:schemeClr val="accent1"/>
+          </a:fillRef>
+          <a:effectRef idx="0">
+            <a:schemeClr val="accent1"/>
+          </a:effectRef>
+          <a:fontRef idx="minor">
+            <a:schemeClr val="tx1"/>
+          </a:fontRef>
+        </p:style>
+      </p:cxnSp>
+      <p:sp>
+        <p:nvSpPr>
+          <p:cNvPr id="69" name="Ellipse 68"/>
           <p:cNvSpPr/>
           <p:nvPr/>
         </p:nvSpPr>
         <p:spPr>
           <a:xfrm>
-            <a:off x="1937351" y="173694"/>
+            <a:off x="3851650" y="3859109"/>
             <a:ext cx="252968" cy="252968"/>
           </a:xfrm>
           <a:prstGeom prst="ellipse">
             <a:avLst/>
           </a:prstGeom>
-          <a:solidFill>
-            <a:schemeClr val="accent6"/>
-          </a:solidFill>
         </p:spPr>
         <p:style>
           <a:lnRef idx="2">
@@ -4077,14 +4088,14 @@
       </p:sp>
       <p:sp>
         <p:nvSpPr>
-          <p:cNvPr id="53" name="ZoneTexte 52"/>
+          <p:cNvPr id="70" name="ZoneTexte 69"/>
           <p:cNvSpPr txBox="1"/>
           <p:nvPr/>
         </p:nvSpPr>
         <p:spPr>
           <a:xfrm>
-            <a:off x="1184232" y="73730"/>
-            <a:ext cx="764312" cy="369332"/>
+            <a:off x="2469718" y="3768661"/>
+            <a:ext cx="1456937" cy="369332"/>
           </a:xfrm>
           <a:prstGeom prst="rect">
             <a:avLst/>
@@ -4098,26 +4109,22 @@
           <a:lstStyle/>
           <a:p>
             <a:r>
-              <a:rPr lang="fr-FR" dirty="0" err="1"/>
-              <a:t>s</a:t>
-            </a:r>
-            <a:r>
               <a:rPr lang="fr-FR" dirty="0" err="1" smtClean="0"/>
-              <a:t>ector</a:t>
-            </a:r>
-            <a:endParaRPr lang="fr-FR" dirty="0" smtClean="0"/>
+              <a:t>diagnosisYear</a:t>
+            </a:r>
+            <a:endParaRPr lang="fr-FR" dirty="0"/>
           </a:p>
         </p:txBody>
       </p:sp>
       <p:cxnSp>
         <p:nvCxnSpPr>
-          <p:cNvPr id="56" name="Connecteur droit 55"/>
+          <p:cNvPr id="71" name="Connecteur droit 70"/>
           <p:cNvCxnSpPr/>
           <p:nvPr/>
         </p:nvCxnSpPr>
         <p:spPr>
-          <a:xfrm rot="5400000">
-            <a:off x="2861163" y="1749876"/>
+          <a:xfrm>
+            <a:off x="4095750" y="4370968"/>
             <a:ext cx="495300" cy="0"/>
           </a:xfrm>
           <a:prstGeom prst="line">
@@ -4144,58 +4151,20 @@
           </a:fontRef>
         </p:style>
       </p:cxnSp>
-      <p:cxnSp>
-        <p:nvCxnSpPr>
-          <p:cNvPr id="57" name="Connecteur droit 56"/>
-          <p:cNvCxnSpPr/>
-          <p:nvPr/>
-        </p:nvCxnSpPr>
-        <p:spPr>
-          <a:xfrm rot="8100000">
-            <a:off x="3111332" y="1121196"/>
-            <a:ext cx="495300" cy="0"/>
-          </a:xfrm>
-          <a:prstGeom prst="line">
-            <a:avLst/>
-          </a:prstGeom>
-          <a:ln>
-            <a:solidFill>
-              <a:schemeClr val="tx1"/>
-            </a:solidFill>
-          </a:ln>
-        </p:spPr>
-        <p:style>
-          <a:lnRef idx="1">
-            <a:schemeClr val="accent1"/>
-          </a:lnRef>
-          <a:fillRef idx="0">
-            <a:schemeClr val="accent1"/>
-          </a:fillRef>
-          <a:effectRef idx="0">
-            <a:schemeClr val="accent1"/>
-          </a:effectRef>
-          <a:fontRef idx="minor">
-            <a:schemeClr val="tx1"/>
-          </a:fontRef>
-        </p:style>
-      </p:cxnSp>
-      <p:sp>
-        <p:nvSpPr>
-          <p:cNvPr id="58" name="Ellipse 57"/>
+      <p:sp>
+        <p:nvSpPr>
+          <p:cNvPr id="72" name="Ellipse 71"/>
           <p:cNvSpPr/>
           <p:nvPr/>
         </p:nvSpPr>
         <p:spPr>
           <a:xfrm>
-            <a:off x="3455451" y="736901"/>
+            <a:off x="3842782" y="4244484"/>
             <a:ext cx="252968" cy="252968"/>
           </a:xfrm>
           <a:prstGeom prst="ellipse">
             <a:avLst/>
           </a:prstGeom>
-          <a:solidFill>
-            <a:schemeClr val="accent6"/>
-          </a:solidFill>
         </p:spPr>
         <p:style>
           <a:lnRef idx="2">
@@ -4224,14 +4193,14 @@
       </p:sp>
       <p:sp>
         <p:nvSpPr>
-          <p:cNvPr id="59" name="ZoneTexte 58"/>
+          <p:cNvPr id="73" name="ZoneTexte 72"/>
           <p:cNvSpPr txBox="1"/>
           <p:nvPr/>
         </p:nvSpPr>
         <p:spPr>
           <a:xfrm>
-            <a:off x="3843627" y="17993"/>
-            <a:ext cx="1800236" cy="369332"/>
+            <a:off x="2402794" y="4154036"/>
+            <a:ext cx="1515864" cy="369332"/>
           </a:xfrm>
           <a:prstGeom prst="rect">
             <a:avLst/>
@@ -4246,29 +4215,61 @@
           <a:p>
             <a:r>
               <a:rPr lang="fr-FR" dirty="0" err="1" smtClean="0"/>
-              <a:t>subCategoryDesc</a:t>
-            </a:r>
-            <a:endParaRPr lang="fr-FR" dirty="0" smtClean="0"/>
-          </a:p>
-        </p:txBody>
-      </p:sp>
-      <p:sp>
-        <p:nvSpPr>
-          <p:cNvPr id="62" name="Ellipse 61"/>
+              <a:t>diagnosisNote</a:t>
+            </a:r>
+            <a:endParaRPr lang="fr-FR" dirty="0"/>
+          </a:p>
+        </p:txBody>
+      </p:sp>
+      <p:cxnSp>
+        <p:nvCxnSpPr>
+          <p:cNvPr id="74" name="Connecteur droit 73"/>
+          <p:cNvCxnSpPr/>
+          <p:nvPr/>
+        </p:nvCxnSpPr>
+        <p:spPr>
+          <a:xfrm>
+            <a:off x="4117524" y="4770108"/>
+            <a:ext cx="495300" cy="0"/>
+          </a:xfrm>
+          <a:prstGeom prst="line">
+            <a:avLst/>
+          </a:prstGeom>
+          <a:ln>
+            <a:solidFill>
+              <a:schemeClr val="tx1"/>
+            </a:solidFill>
+          </a:ln>
+        </p:spPr>
+        <p:style>
+          <a:lnRef idx="1">
+            <a:schemeClr val="accent1"/>
+          </a:lnRef>
+          <a:fillRef idx="0">
+            <a:schemeClr val="accent1"/>
+          </a:fillRef>
+          <a:effectRef idx="0">
+            <a:schemeClr val="accent1"/>
+          </a:effectRef>
+          <a:fontRef idx="minor">
+            <a:schemeClr val="tx1"/>
+          </a:fontRef>
+        </p:style>
+      </p:cxnSp>
+      <p:sp>
+        <p:nvSpPr>
+          <p:cNvPr id="75" name="Ellipse 74"/>
           <p:cNvSpPr/>
           <p:nvPr/>
         </p:nvSpPr>
         <p:spPr>
           <a:xfrm>
-            <a:off x="5164397" y="1262812"/>
+            <a:off x="3864556" y="4643624"/>
             <a:ext cx="252968" cy="252968"/>
           </a:xfrm>
           <a:prstGeom prst="ellipse">
             <a:avLst/>
           </a:prstGeom>
-          <a:solidFill>
-            <a:schemeClr val="accent6"/>
-          </a:solidFill>
         </p:spPr>
         <p:style>
           <a:lnRef idx="2">
@@ -4297,14 +4298,14 @@
       </p:sp>
       <p:sp>
         <p:nvSpPr>
-          <p:cNvPr id="63" name="ZoneTexte 62"/>
+          <p:cNvPr id="76" name="ZoneTexte 75"/>
           <p:cNvSpPr txBox="1"/>
           <p:nvPr/>
         </p:nvSpPr>
         <p:spPr>
           <a:xfrm>
-            <a:off x="5417365" y="1194670"/>
-            <a:ext cx="867545" cy="369332"/>
+            <a:off x="1951041" y="4553176"/>
+            <a:ext cx="2008050" cy="369332"/>
           </a:xfrm>
           <a:prstGeom prst="rect">
             <a:avLst/>
@@ -4319,63 +4320,28 @@
           <a:p>
             <a:r>
               <a:rPr lang="fr-FR" dirty="0" err="1" smtClean="0"/>
-              <a:t>species</a:t>
+              <a:t>developmentStatus</a:t>
             </a:r>
             <a:endParaRPr lang="fr-FR" dirty="0"/>
           </a:p>
         </p:txBody>
       </p:sp>
-      <p:cxnSp>
-        <p:nvCxnSpPr>
-          <p:cNvPr id="64" name="Connecteur droit 63"/>
-          <p:cNvCxnSpPr/>
-          <p:nvPr/>
-        </p:nvCxnSpPr>
-        <p:spPr>
-          <a:xfrm rot="5400000">
-            <a:off x="5048673" y="1768866"/>
-            <a:ext cx="495300" cy="0"/>
-          </a:xfrm>
-          <a:prstGeom prst="line">
-            <a:avLst/>
-          </a:prstGeom>
-          <a:ln>
-            <a:solidFill>
-              <a:schemeClr val="tx1"/>
-            </a:solidFill>
-          </a:ln>
-        </p:spPr>
-        <p:style>
-          <a:lnRef idx="1">
-            <a:schemeClr val="accent1"/>
-          </a:lnRef>
-          <a:fillRef idx="0">
-            <a:schemeClr val="accent1"/>
-          </a:fillRef>
-          <a:effectRef idx="0">
-            <a:schemeClr val="accent1"/>
-          </a:effectRef>
-          <a:fontRef idx="minor">
-            <a:schemeClr val="tx1"/>
-          </a:fontRef>
-        </p:style>
-      </p:cxnSp>
-      <p:sp>
-        <p:nvSpPr>
-          <p:cNvPr id="65" name="Ellipse 64"/>
+      <p:sp>
+        <p:nvSpPr>
+          <p:cNvPr id="77" name="Ellipse 76"/>
           <p:cNvSpPr/>
           <p:nvPr/>
         </p:nvSpPr>
         <p:spPr>
           <a:xfrm>
-            <a:off x="5130999" y="515505"/>
+            <a:off x="4772905" y="6079706"/>
             <a:ext cx="252968" cy="252968"/>
           </a:xfrm>
           <a:prstGeom prst="ellipse">
             <a:avLst/>
           </a:prstGeom>
           <a:solidFill>
-            <a:schemeClr val="accent6"/>
+            <a:schemeClr val="accent4"/>
           </a:solidFill>
         </p:spPr>
         <p:style>
@@ -4403,15 +4369,49 @@
           </a:p>
         </p:txBody>
       </p:sp>
+      <p:sp>
+        <p:nvSpPr>
+          <p:cNvPr id="78" name="ZoneTexte 77"/>
+          <p:cNvSpPr txBox="1"/>
+          <p:nvPr/>
+        </p:nvSpPr>
+        <p:spPr>
+          <a:xfrm>
+            <a:off x="2976315" y="5969210"/>
+            <a:ext cx="1876732" cy="369332"/>
+          </a:xfrm>
+          <a:prstGeom prst="rect">
+            <a:avLst/>
+          </a:prstGeom>
+          <a:noFill/>
+        </p:spPr>
+        <p:txBody>
+          <a:bodyPr wrap="none" rtlCol="0">
+            <a:spAutoFit/>
+          </a:bodyPr>
+          <a:lstStyle/>
+          <a:p>
+            <a:r>
+              <a:rPr lang="fr-FR" dirty="0" err="1"/>
+              <a:t>s</a:t>
+            </a:r>
+            <a:r>
+              <a:rPr lang="fr-FR" dirty="0" err="1" smtClean="0"/>
+              <a:t>idewalkProximity</a:t>
+            </a:r>
+            <a:endParaRPr lang="fr-FR" dirty="0"/>
+          </a:p>
+        </p:txBody>
+      </p:sp>
       <p:cxnSp>
         <p:nvCxnSpPr>
-          <p:cNvPr id="66" name="Connecteur droit 65"/>
+          <p:cNvPr id="79" name="Connecteur droit 78"/>
           <p:cNvCxnSpPr/>
           <p:nvPr/>
         </p:nvCxnSpPr>
         <p:spPr>
           <a:xfrm rot="5400000">
-            <a:off x="5029789" y="1021559"/>
+            <a:off x="4654382" y="5848366"/>
             <a:ext cx="495300" cy="0"/>
           </a:xfrm>
           <a:prstGeom prst="line">
@@ -4440,83 +4440,21 @@
       </p:cxnSp>
       <p:sp>
         <p:nvSpPr>
-          <p:cNvPr id="67" name="ZoneTexte 66"/>
-          <p:cNvSpPr txBox="1"/>
-          <p:nvPr/>
-        </p:nvSpPr>
-        <p:spPr>
-          <a:xfrm>
-            <a:off x="5383967" y="433702"/>
-            <a:ext cx="740587" cy="369332"/>
-          </a:xfrm>
-          <a:prstGeom prst="rect">
-            <a:avLst/>
-          </a:prstGeom>
-          <a:noFill/>
-        </p:spPr>
-        <p:txBody>
-          <a:bodyPr wrap="none" rtlCol="0">
-            <a:spAutoFit/>
-          </a:bodyPr>
-          <a:lstStyle/>
-          <a:p>
-            <a:r>
-              <a:rPr lang="fr-FR" dirty="0" err="1" smtClean="0"/>
-              <a:t>genus</a:t>
-            </a:r>
-            <a:endParaRPr lang="fr-FR" dirty="0"/>
-          </a:p>
-        </p:txBody>
-      </p:sp>
-      <p:cxnSp>
-        <p:nvCxnSpPr>
-          <p:cNvPr id="68" name="Connecteur droit 67"/>
-          <p:cNvCxnSpPr/>
-          <p:nvPr/>
-        </p:nvCxnSpPr>
-        <p:spPr>
-          <a:xfrm>
-            <a:off x="2561568" y="3328803"/>
-            <a:ext cx="495300" cy="0"/>
-          </a:xfrm>
-          <a:prstGeom prst="line">
-            <a:avLst/>
-          </a:prstGeom>
-          <a:ln>
-            <a:solidFill>
-              <a:schemeClr val="tx1"/>
-            </a:solidFill>
-          </a:ln>
-        </p:spPr>
-        <p:style>
-          <a:lnRef idx="1">
-            <a:schemeClr val="accent1"/>
-          </a:lnRef>
-          <a:fillRef idx="0">
-            <a:schemeClr val="accent1"/>
-          </a:fillRef>
-          <a:effectRef idx="0">
-            <a:schemeClr val="accent1"/>
-          </a:effectRef>
-          <a:fontRef idx="minor">
-            <a:schemeClr val="tx1"/>
-          </a:fontRef>
-        </p:style>
-      </p:cxnSp>
-      <p:sp>
-        <p:nvSpPr>
-          <p:cNvPr id="69" name="Ellipse 68"/>
+          <p:cNvPr id="80" name="Ellipse 79"/>
           <p:cNvSpPr/>
           <p:nvPr/>
         </p:nvSpPr>
         <p:spPr>
           <a:xfrm>
-            <a:off x="2308600" y="3202319"/>
+            <a:off x="5374398" y="6268644"/>
             <a:ext cx="252968" cy="252968"/>
           </a:xfrm>
           <a:prstGeom prst="ellipse">
             <a:avLst/>
           </a:prstGeom>
+          <a:solidFill>
+            <a:schemeClr val="accent4"/>
+          </a:solidFill>
         </p:spPr>
         <p:style>
           <a:lnRef idx="2">
@@ -4545,14 +4483,14 @@
       </p:sp>
       <p:sp>
         <p:nvSpPr>
-          <p:cNvPr id="70" name="ZoneTexte 69"/>
+          <p:cNvPr id="81" name="ZoneTexte 80"/>
           <p:cNvSpPr txBox="1"/>
           <p:nvPr/>
         </p:nvSpPr>
         <p:spPr>
           <a:xfrm>
-            <a:off x="926668" y="3111871"/>
-            <a:ext cx="1456937" cy="369332"/>
+            <a:off x="4550290" y="6488668"/>
+            <a:ext cx="2245102" cy="369332"/>
           </a:xfrm>
           <a:prstGeom prst="rect">
             <a:avLst/>
@@ -4567,22 +4505,24 @@
           <a:p>
             <a:r>
               <a:rPr lang="fr-FR" dirty="0" err="1" smtClean="0"/>
-              <a:t>diagnosisYear</a:t>
-            </a:r>
-            <a:endParaRPr lang="fr-FR" dirty="0"/>
+              <a:t>environmentBusyness</a:t>
+            </a:r>
+            <a:endParaRPr lang="fr-FR" dirty="0" smtClean="0"/>
           </a:p>
         </p:txBody>
       </p:sp>
       <p:cxnSp>
         <p:nvCxnSpPr>
-          <p:cNvPr id="71" name="Connecteur droit 70"/>
-          <p:cNvCxnSpPr/>
+          <p:cNvPr id="82" name="Connecteur droit 81"/>
+          <p:cNvCxnSpPr>
+            <a:endCxn id="80" idx="0"/>
+          </p:cNvCxnSpPr>
           <p:nvPr/>
         </p:nvCxnSpPr>
         <p:spPr>
-          <a:xfrm>
-            <a:off x="2552700" y="3714178"/>
-            <a:ext cx="495300" cy="0"/>
+          <a:xfrm flipH="1">
+            <a:off x="5500882" y="5608679"/>
+            <a:ext cx="2643" cy="659965"/>
           </a:xfrm>
           <a:prstGeom prst="line">
             <a:avLst/>
@@ -4610,18 +4550,21 @@
       </p:cxnSp>
       <p:sp>
         <p:nvSpPr>
-          <p:cNvPr id="72" name="Ellipse 71"/>
+          <p:cNvPr id="86" name="Ellipse 85"/>
           <p:cNvSpPr/>
           <p:nvPr/>
         </p:nvSpPr>
         <p:spPr>
           <a:xfrm>
-            <a:off x="2299732" y="3587694"/>
+            <a:off x="5906880" y="6060716"/>
             <a:ext cx="252968" cy="252968"/>
           </a:xfrm>
           <a:prstGeom prst="ellipse">
             <a:avLst/>
           </a:prstGeom>
+          <a:solidFill>
+            <a:schemeClr val="accent4"/>
+          </a:solidFill>
         </p:spPr>
         <p:style>
           <a:lnRef idx="2">
@@ -4650,14 +4593,14 @@
       </p:sp>
       <p:sp>
         <p:nvSpPr>
-          <p:cNvPr id="73" name="ZoneTexte 72"/>
+          <p:cNvPr id="87" name="ZoneTexte 86"/>
           <p:cNvSpPr txBox="1"/>
           <p:nvPr/>
         </p:nvSpPr>
         <p:spPr>
           <a:xfrm>
-            <a:off x="859744" y="3497246"/>
-            <a:ext cx="1515864" cy="369332"/>
+            <a:off x="6118447" y="5969210"/>
+            <a:ext cx="651140" cy="369332"/>
           </a:xfrm>
           <a:prstGeom prst="rect">
             <a:avLst/>
@@ -4672,21 +4615,21 @@
           <a:p>
             <a:r>
               <a:rPr lang="fr-FR" dirty="0" err="1" smtClean="0"/>
-              <a:t>diagnosisNote</a:t>
-            </a:r>
-            <a:endParaRPr lang="fr-FR" dirty="0"/>
+              <a:t>vigor</a:t>
+            </a:r>
+            <a:endParaRPr lang="fr-FR" dirty="0" smtClean="0"/>
           </a:p>
         </p:txBody>
       </p:sp>
       <p:cxnSp>
         <p:nvCxnSpPr>
-          <p:cNvPr id="74" name="Connecteur droit 73"/>
+          <p:cNvPr id="88" name="Connecteur droit 87"/>
           <p:cNvCxnSpPr/>
           <p:nvPr/>
         </p:nvCxnSpPr>
         <p:spPr>
-          <a:xfrm>
-            <a:off x="2574474" y="4113318"/>
+          <a:xfrm rot="5400000">
+            <a:off x="5788357" y="5829376"/>
             <a:ext cx="495300" cy="0"/>
           </a:xfrm>
           <a:prstGeom prst="line">
@@ -4715,18 +4658,21 @@
       </p:cxnSp>
       <p:sp>
         <p:nvSpPr>
-          <p:cNvPr id="75" name="Ellipse 74"/>
+          <p:cNvPr id="90" name="Ellipse 89"/>
           <p:cNvSpPr/>
           <p:nvPr/>
         </p:nvSpPr>
         <p:spPr>
           <a:xfrm>
-            <a:off x="2321506" y="3986834"/>
+            <a:off x="6926125" y="6063456"/>
             <a:ext cx="252968" cy="252968"/>
           </a:xfrm>
           <a:prstGeom prst="ellipse">
             <a:avLst/>
           </a:prstGeom>
+          <a:solidFill>
+            <a:schemeClr val="accent4"/>
+          </a:solidFill>
         </p:spPr>
         <p:style>
           <a:lnRef idx="2">
@@ -4755,422 +4701,13 @@
       </p:sp>
       <p:sp>
         <p:nvSpPr>
-          <p:cNvPr id="76" name="ZoneTexte 75"/>
-          <p:cNvSpPr txBox="1"/>
-          <p:nvPr/>
-        </p:nvSpPr>
-        <p:spPr>
-          <a:xfrm>
-            <a:off x="484191" y="3896386"/>
-            <a:ext cx="1877309" cy="369332"/>
-          </a:xfrm>
-          <a:prstGeom prst="rect">
-            <a:avLst/>
-          </a:prstGeom>
-          <a:noFill/>
-        </p:spPr>
-        <p:txBody>
-          <a:bodyPr wrap="none" rtlCol="0">
-            <a:spAutoFit/>
-          </a:bodyPr>
-          <a:lstStyle/>
-          <a:p>
-            <a:r>
-              <a:rPr lang="fr-FR" dirty="0" err="1"/>
-              <a:t>d</a:t>
-            </a:r>
-            <a:r>
-              <a:rPr lang="fr-FR" dirty="0" err="1" smtClean="0"/>
-              <a:t>vpStatWhenDiag</a:t>
-            </a:r>
-            <a:endParaRPr lang="fr-FR" dirty="0"/>
-          </a:p>
-        </p:txBody>
-      </p:sp>
-      <p:sp>
-        <p:nvSpPr>
-          <p:cNvPr id="77" name="Ellipse 76"/>
-          <p:cNvSpPr/>
-          <p:nvPr/>
-        </p:nvSpPr>
-        <p:spPr>
-          <a:xfrm>
-            <a:off x="3229855" y="5422916"/>
-            <a:ext cx="252968" cy="252968"/>
-          </a:xfrm>
-          <a:prstGeom prst="ellipse">
-            <a:avLst/>
-          </a:prstGeom>
-          <a:solidFill>
-            <a:schemeClr val="accent4"/>
-          </a:solidFill>
-        </p:spPr>
-        <p:style>
-          <a:lnRef idx="2">
-            <a:schemeClr val="accent1">
-              <a:shade val="50000"/>
-            </a:schemeClr>
-          </a:lnRef>
-          <a:fillRef idx="1">
-            <a:schemeClr val="accent1"/>
-          </a:fillRef>
-          <a:effectRef idx="0">
-            <a:schemeClr val="accent1"/>
-          </a:effectRef>
-          <a:fontRef idx="minor">
-            <a:schemeClr val="lt1"/>
-          </a:fontRef>
-        </p:style>
-        <p:txBody>
-          <a:bodyPr rtlCol="0" anchor="ctr"/>
-          <a:lstStyle/>
-          <a:p>
-            <a:pPr algn="ctr"/>
-            <a:endParaRPr lang="fr-FR"/>
-          </a:p>
-        </p:txBody>
-      </p:sp>
-      <p:sp>
-        <p:nvSpPr>
-          <p:cNvPr id="78" name="ZoneTexte 77"/>
-          <p:cNvSpPr txBox="1"/>
-          <p:nvPr/>
-        </p:nvSpPr>
-        <p:spPr>
-          <a:xfrm>
-            <a:off x="1433265" y="5312420"/>
-            <a:ext cx="1876732" cy="369332"/>
-          </a:xfrm>
-          <a:prstGeom prst="rect">
-            <a:avLst/>
-          </a:prstGeom>
-          <a:noFill/>
-        </p:spPr>
-        <p:txBody>
-          <a:bodyPr wrap="none" rtlCol="0">
-            <a:spAutoFit/>
-          </a:bodyPr>
-          <a:lstStyle/>
-          <a:p>
-            <a:r>
-              <a:rPr lang="fr-FR" dirty="0" err="1"/>
-              <a:t>s</a:t>
-            </a:r>
-            <a:r>
-              <a:rPr lang="fr-FR" dirty="0" err="1" smtClean="0"/>
-              <a:t>idewalkProximity</a:t>
-            </a:r>
-            <a:endParaRPr lang="fr-FR" dirty="0"/>
-          </a:p>
-        </p:txBody>
-      </p:sp>
-      <p:cxnSp>
-        <p:nvCxnSpPr>
-          <p:cNvPr id="79" name="Connecteur droit 78"/>
-          <p:cNvCxnSpPr/>
-          <p:nvPr/>
-        </p:nvCxnSpPr>
-        <p:spPr>
-          <a:xfrm rot="5400000">
-            <a:off x="3111332" y="5191576"/>
-            <a:ext cx="495300" cy="0"/>
-          </a:xfrm>
-          <a:prstGeom prst="line">
-            <a:avLst/>
-          </a:prstGeom>
-          <a:ln>
-            <a:solidFill>
-              <a:schemeClr val="tx1"/>
-            </a:solidFill>
-          </a:ln>
-        </p:spPr>
-        <p:style>
-          <a:lnRef idx="1">
-            <a:schemeClr val="accent1"/>
-          </a:lnRef>
-          <a:fillRef idx="0">
-            <a:schemeClr val="accent1"/>
-          </a:fillRef>
-          <a:effectRef idx="0">
-            <a:schemeClr val="accent1"/>
-          </a:effectRef>
-          <a:fontRef idx="minor">
-            <a:schemeClr val="tx1"/>
-          </a:fontRef>
-        </p:style>
-      </p:cxnSp>
-      <p:sp>
-        <p:nvSpPr>
-          <p:cNvPr id="80" name="Ellipse 79"/>
-          <p:cNvSpPr/>
-          <p:nvPr/>
-        </p:nvSpPr>
-        <p:spPr>
-          <a:xfrm>
-            <a:off x="3831348" y="5430879"/>
-            <a:ext cx="252968" cy="252968"/>
-          </a:xfrm>
-          <a:prstGeom prst="ellipse">
-            <a:avLst/>
-          </a:prstGeom>
-          <a:solidFill>
-            <a:schemeClr val="accent4"/>
-          </a:solidFill>
-        </p:spPr>
-        <p:style>
-          <a:lnRef idx="2">
-            <a:schemeClr val="accent1">
-              <a:shade val="50000"/>
-            </a:schemeClr>
-          </a:lnRef>
-          <a:fillRef idx="1">
-            <a:schemeClr val="accent1"/>
-          </a:fillRef>
-          <a:effectRef idx="0">
-            <a:schemeClr val="accent1"/>
-          </a:effectRef>
-          <a:fontRef idx="minor">
-            <a:schemeClr val="lt1"/>
-          </a:fontRef>
-        </p:style>
-        <p:txBody>
-          <a:bodyPr rtlCol="0" anchor="ctr"/>
-          <a:lstStyle/>
-          <a:p>
-            <a:pPr algn="ctr"/>
-            <a:endParaRPr lang="fr-FR"/>
-          </a:p>
-        </p:txBody>
-      </p:sp>
-      <p:sp>
-        <p:nvSpPr>
-          <p:cNvPr id="81" name="ZoneTexte 80"/>
-          <p:cNvSpPr txBox="1"/>
-          <p:nvPr/>
-        </p:nvSpPr>
-        <p:spPr>
-          <a:xfrm>
-            <a:off x="3482823" y="5649868"/>
-            <a:ext cx="1034899" cy="369332"/>
-          </a:xfrm>
-          <a:prstGeom prst="rect">
-            <a:avLst/>
-          </a:prstGeom>
-          <a:noFill/>
-        </p:spPr>
-        <p:txBody>
-          <a:bodyPr wrap="none" rtlCol="0">
-            <a:spAutoFit/>
-          </a:bodyPr>
-          <a:lstStyle/>
-          <a:p>
-            <a:r>
-              <a:rPr lang="fr-FR" dirty="0" err="1"/>
-              <a:t>b</a:t>
-            </a:r>
-            <a:r>
-              <a:rPr lang="fr-FR" dirty="0" err="1" smtClean="0"/>
-              <a:t>usyness</a:t>
-            </a:r>
-            <a:endParaRPr lang="fr-FR" dirty="0" smtClean="0"/>
-          </a:p>
-        </p:txBody>
-      </p:sp>
-      <p:cxnSp>
-        <p:nvCxnSpPr>
-          <p:cNvPr id="82" name="Connecteur droit 81"/>
-          <p:cNvCxnSpPr/>
-          <p:nvPr/>
-        </p:nvCxnSpPr>
-        <p:spPr>
-          <a:xfrm rot="5400000">
-            <a:off x="3712825" y="5199539"/>
-            <a:ext cx="495300" cy="0"/>
-          </a:xfrm>
-          <a:prstGeom prst="line">
-            <a:avLst/>
-          </a:prstGeom>
-          <a:ln>
-            <a:solidFill>
-              <a:schemeClr val="tx1"/>
-            </a:solidFill>
-          </a:ln>
-        </p:spPr>
-        <p:style>
-          <a:lnRef idx="1">
-            <a:schemeClr val="accent1"/>
-          </a:lnRef>
-          <a:fillRef idx="0">
-            <a:schemeClr val="accent1"/>
-          </a:fillRef>
-          <a:effectRef idx="0">
-            <a:schemeClr val="accent1"/>
-          </a:effectRef>
-          <a:fontRef idx="minor">
-            <a:schemeClr val="tx1"/>
-          </a:fontRef>
-        </p:style>
-      </p:cxnSp>
-      <p:sp>
-        <p:nvSpPr>
-          <p:cNvPr id="86" name="Ellipse 85"/>
-          <p:cNvSpPr/>
-          <p:nvPr/>
-        </p:nvSpPr>
-        <p:spPr>
-          <a:xfrm>
-            <a:off x="4363830" y="5403926"/>
-            <a:ext cx="252968" cy="252968"/>
-          </a:xfrm>
-          <a:prstGeom prst="ellipse">
-            <a:avLst/>
-          </a:prstGeom>
-          <a:solidFill>
-            <a:schemeClr val="accent4"/>
-          </a:solidFill>
-        </p:spPr>
-        <p:style>
-          <a:lnRef idx="2">
-            <a:schemeClr val="accent1">
-              <a:shade val="50000"/>
-            </a:schemeClr>
-          </a:lnRef>
-          <a:fillRef idx="1">
-            <a:schemeClr val="accent1"/>
-          </a:fillRef>
-          <a:effectRef idx="0">
-            <a:schemeClr val="accent1"/>
-          </a:effectRef>
-          <a:fontRef idx="minor">
-            <a:schemeClr val="lt1"/>
-          </a:fontRef>
-        </p:style>
-        <p:txBody>
-          <a:bodyPr rtlCol="0" anchor="ctr"/>
-          <a:lstStyle/>
-          <a:p>
-            <a:pPr algn="ctr"/>
-            <a:endParaRPr lang="fr-FR"/>
-          </a:p>
-        </p:txBody>
-      </p:sp>
-      <p:sp>
-        <p:nvSpPr>
-          <p:cNvPr id="87" name="ZoneTexte 86"/>
-          <p:cNvSpPr txBox="1"/>
-          <p:nvPr/>
-        </p:nvSpPr>
-        <p:spPr>
-          <a:xfrm>
-            <a:off x="4575397" y="5312420"/>
-            <a:ext cx="651140" cy="369332"/>
-          </a:xfrm>
-          <a:prstGeom prst="rect">
-            <a:avLst/>
-          </a:prstGeom>
-          <a:noFill/>
-        </p:spPr>
-        <p:txBody>
-          <a:bodyPr wrap="none" rtlCol="0">
-            <a:spAutoFit/>
-          </a:bodyPr>
-          <a:lstStyle/>
-          <a:p>
-            <a:r>
-              <a:rPr lang="fr-FR" dirty="0" err="1" smtClean="0"/>
-              <a:t>vigor</a:t>
-            </a:r>
-            <a:endParaRPr lang="fr-FR" dirty="0" smtClean="0"/>
-          </a:p>
-        </p:txBody>
-      </p:sp>
-      <p:cxnSp>
-        <p:nvCxnSpPr>
-          <p:cNvPr id="88" name="Connecteur droit 87"/>
-          <p:cNvCxnSpPr/>
-          <p:nvPr/>
-        </p:nvCxnSpPr>
-        <p:spPr>
-          <a:xfrm rot="5400000">
-            <a:off x="4245307" y="5172586"/>
-            <a:ext cx="495300" cy="0"/>
-          </a:xfrm>
-          <a:prstGeom prst="line">
-            <a:avLst/>
-          </a:prstGeom>
-          <a:ln>
-            <a:solidFill>
-              <a:schemeClr val="tx1"/>
-            </a:solidFill>
-          </a:ln>
-        </p:spPr>
-        <p:style>
-          <a:lnRef idx="1">
-            <a:schemeClr val="accent1"/>
-          </a:lnRef>
-          <a:fillRef idx="0">
-            <a:schemeClr val="accent1"/>
-          </a:fillRef>
-          <a:effectRef idx="0">
-            <a:schemeClr val="accent1"/>
-          </a:effectRef>
-          <a:fontRef idx="minor">
-            <a:schemeClr val="tx1"/>
-          </a:fontRef>
-        </p:style>
-      </p:cxnSp>
-      <p:sp>
-        <p:nvSpPr>
-          <p:cNvPr id="90" name="Ellipse 89"/>
-          <p:cNvSpPr/>
-          <p:nvPr/>
-        </p:nvSpPr>
-        <p:spPr>
-          <a:xfrm>
-            <a:off x="5383075" y="5406666"/>
-            <a:ext cx="252968" cy="252968"/>
-          </a:xfrm>
-          <a:prstGeom prst="ellipse">
-            <a:avLst/>
-          </a:prstGeom>
-          <a:solidFill>
-            <a:schemeClr val="accent4"/>
-          </a:solidFill>
-        </p:spPr>
-        <p:style>
-          <a:lnRef idx="2">
-            <a:schemeClr val="accent1">
-              <a:shade val="50000"/>
-            </a:schemeClr>
-          </a:lnRef>
-          <a:fillRef idx="1">
-            <a:schemeClr val="accent1"/>
-          </a:fillRef>
-          <a:effectRef idx="0">
-            <a:schemeClr val="accent1"/>
-          </a:effectRef>
-          <a:fontRef idx="minor">
-            <a:schemeClr val="lt1"/>
-          </a:fontRef>
-        </p:style>
-        <p:txBody>
-          <a:bodyPr rtlCol="0" anchor="ctr"/>
-          <a:lstStyle/>
-          <a:p>
-            <a:pPr algn="ctr"/>
-            <a:endParaRPr lang="fr-FR"/>
-          </a:p>
-        </p:txBody>
-      </p:sp>
-      <p:sp>
-        <p:nvSpPr>
           <p:cNvPr id="91" name="ZoneTexte 90"/>
           <p:cNvSpPr txBox="1"/>
           <p:nvPr/>
         </p:nvSpPr>
         <p:spPr>
           <a:xfrm>
-            <a:off x="5034550" y="5625655"/>
+            <a:off x="7231325" y="6007366"/>
             <a:ext cx="1651542" cy="369332"/>
           </a:xfrm>
           <a:prstGeom prst="rect">
@@ -5200,7 +4737,7 @@
         </p:nvCxnSpPr>
         <p:spPr>
           <a:xfrm rot="5400000">
-            <a:off x="5264552" y="5175326"/>
+            <a:off x="6807602" y="5832116"/>
             <a:ext cx="495300" cy="0"/>
           </a:xfrm>
           <a:prstGeom prst="line">
@@ -5235,7 +4772,7 @@
         </p:nvCxnSpPr>
         <p:spPr>
           <a:xfrm>
-            <a:off x="5958114" y="2379307"/>
+            <a:off x="7501164" y="3531397"/>
             <a:ext cx="495300" cy="0"/>
           </a:xfrm>
           <a:prstGeom prst="line">
@@ -5270,7 +4807,7 @@
         </p:nvSpPr>
         <p:spPr>
           <a:xfrm>
-            <a:off x="6453414" y="2252823"/>
+            <a:off x="7996464" y="3404913"/>
             <a:ext cx="252968" cy="252968"/>
           </a:xfrm>
           <a:prstGeom prst="ellipse">
@@ -5313,7 +4850,7 @@
         </p:nvSpPr>
         <p:spPr>
           <a:xfrm>
-            <a:off x="6683484" y="2156541"/>
+            <a:off x="8226534" y="3308631"/>
             <a:ext cx="1312667" cy="369332"/>
           </a:xfrm>
           <a:prstGeom prst="rect">
@@ -5335,16 +4872,89 @@
           </a:p>
         </p:txBody>
       </p:sp>
+      <p:sp>
+        <p:nvSpPr>
+          <p:cNvPr id="85" name="Ellipse 84"/>
+          <p:cNvSpPr/>
+          <p:nvPr/>
+        </p:nvSpPr>
+        <p:spPr>
+          <a:xfrm>
+            <a:off x="5559376" y="1073759"/>
+            <a:ext cx="861790" cy="861790"/>
+          </a:xfrm>
+          <a:prstGeom prst="ellipse">
+            <a:avLst/>
+          </a:prstGeom>
+          <a:solidFill>
+            <a:schemeClr val="accent6"/>
+          </a:solidFill>
+        </p:spPr>
+        <p:style>
+          <a:lnRef idx="2">
+            <a:schemeClr val="accent1">
+              <a:shade val="50000"/>
+            </a:schemeClr>
+          </a:lnRef>
+          <a:fillRef idx="1">
+            <a:schemeClr val="accent1"/>
+          </a:fillRef>
+          <a:effectRef idx="0">
+            <a:schemeClr val="accent1"/>
+          </a:effectRef>
+          <a:fontRef idx="minor">
+            <a:schemeClr val="lt1"/>
+          </a:fontRef>
+        </p:style>
+        <p:txBody>
+          <a:bodyPr rtlCol="0" anchor="ctr"/>
+          <a:lstStyle/>
+          <a:p>
+            <a:pPr algn="ctr"/>
+            <a:endParaRPr lang="fr-FR"/>
+          </a:p>
+        </p:txBody>
+      </p:sp>
+      <p:sp>
+        <p:nvSpPr>
+          <p:cNvPr id="89" name="ZoneTexte 88"/>
+          <p:cNvSpPr txBox="1"/>
+          <p:nvPr/>
+        </p:nvSpPr>
+        <p:spPr>
+          <a:xfrm>
+            <a:off x="5990271" y="1912850"/>
+            <a:ext cx="937244" cy="369332"/>
+          </a:xfrm>
+          <a:prstGeom prst="rect">
+            <a:avLst/>
+          </a:prstGeom>
+          <a:noFill/>
+        </p:spPr>
+        <p:txBody>
+          <a:bodyPr wrap="none" rtlCol="0">
+            <a:spAutoFit/>
+          </a:bodyPr>
+          <a:lstStyle/>
+          <a:p>
+            <a:r>
+              <a:rPr lang="fr-FR" dirty="0" smtClean="0"/>
+              <a:t>location</a:t>
+            </a:r>
+            <a:endParaRPr lang="fr-FR" dirty="0"/>
+          </a:p>
+        </p:txBody>
+      </p:sp>
       <p:cxnSp>
         <p:nvCxnSpPr>
-          <p:cNvPr id="83" name="Connecteur droit 82"/>
+          <p:cNvPr id="93" name="Connecteur droit 92"/>
           <p:cNvCxnSpPr/>
           <p:nvPr/>
         </p:nvCxnSpPr>
         <p:spPr>
-          <a:xfrm rot="8100000">
-            <a:off x="3558246" y="585371"/>
-            <a:ext cx="495300" cy="0"/>
+          <a:xfrm>
+            <a:off x="5990271" y="1935549"/>
+            <a:ext cx="0" cy="712139"/>
           </a:xfrm>
           <a:prstGeom prst="line">
             <a:avLst/>
@@ -5370,46 +4980,16 @@
           </a:fontRef>
         </p:style>
       </p:cxnSp>
-      <p:sp>
-        <p:nvSpPr>
-          <p:cNvPr id="84" name="ZoneTexte 83"/>
-          <p:cNvSpPr txBox="1"/>
-          <p:nvPr/>
-        </p:nvSpPr>
-        <p:spPr>
-          <a:xfrm>
-            <a:off x="3831566" y="807218"/>
-            <a:ext cx="1354602" cy="369332"/>
-          </a:xfrm>
-          <a:prstGeom prst="rect">
-            <a:avLst/>
-          </a:prstGeom>
-          <a:noFill/>
-        </p:spPr>
-        <p:txBody>
-          <a:bodyPr wrap="none" rtlCol="0">
-            <a:spAutoFit/>
-          </a:bodyPr>
-          <a:lstStyle/>
-          <a:p>
-            <a:r>
-              <a:rPr lang="fr-FR" dirty="0" err="1" smtClean="0"/>
-              <a:t>subCategory</a:t>
-            </a:r>
-            <a:endParaRPr lang="fr-FR" dirty="0"/>
-          </a:p>
-        </p:txBody>
-      </p:sp>
       <p:cxnSp>
         <p:nvCxnSpPr>
-          <p:cNvPr id="13" name="Connecteur droit 12"/>
+          <p:cNvPr id="94" name="Connecteur droit 93"/>
           <p:cNvCxnSpPr/>
           <p:nvPr/>
         </p:nvCxnSpPr>
         <p:spPr>
-          <a:xfrm>
-            <a:off x="3960545" y="405634"/>
-            <a:ext cx="1674609" cy="0"/>
+          <a:xfrm flipV="1">
+            <a:off x="5095340" y="1848318"/>
+            <a:ext cx="612771" cy="1"/>
           </a:xfrm>
           <a:prstGeom prst="line">
             <a:avLst/>
@@ -5435,6 +5015,1379 @@
           </a:fontRef>
         </p:style>
       </p:cxnSp>
+      <p:sp>
+        <p:nvSpPr>
+          <p:cNvPr id="95" name="ZoneTexte 94"/>
+          <p:cNvSpPr txBox="1"/>
+          <p:nvPr/>
+        </p:nvSpPr>
+        <p:spPr>
+          <a:xfrm>
+            <a:off x="4545322" y="1972617"/>
+            <a:ext cx="1007520" cy="369332"/>
+          </a:xfrm>
+          <a:prstGeom prst="rect">
+            <a:avLst/>
+          </a:prstGeom>
+          <a:noFill/>
+        </p:spPr>
+        <p:txBody>
+          <a:bodyPr wrap="none" rtlCol="0">
+            <a:spAutoFit/>
+          </a:bodyPr>
+          <a:lstStyle/>
+          <a:p>
+            <a:r>
+              <a:rPr lang="fr-FR" dirty="0" err="1" smtClean="0"/>
+              <a:t>stationId</a:t>
+            </a:r>
+            <a:endParaRPr lang="fr-FR" dirty="0" smtClean="0"/>
+          </a:p>
+        </p:txBody>
+      </p:sp>
+      <p:cxnSp>
+        <p:nvCxnSpPr>
+          <p:cNvPr id="99" name="Connecteur droit 98"/>
+          <p:cNvCxnSpPr/>
+          <p:nvPr/>
+        </p:nvCxnSpPr>
+        <p:spPr>
+          <a:xfrm>
+            <a:off x="4376124" y="1845668"/>
+            <a:ext cx="495300" cy="0"/>
+          </a:xfrm>
+          <a:prstGeom prst="line">
+            <a:avLst/>
+          </a:prstGeom>
+          <a:ln>
+            <a:solidFill>
+              <a:schemeClr val="tx1"/>
+            </a:solidFill>
+          </a:ln>
+        </p:spPr>
+        <p:style>
+          <a:lnRef idx="1">
+            <a:schemeClr val="accent1"/>
+          </a:lnRef>
+          <a:fillRef idx="0">
+            <a:schemeClr val="accent1"/>
+          </a:fillRef>
+          <a:effectRef idx="0">
+            <a:schemeClr val="accent1"/>
+          </a:effectRef>
+          <a:fontRef idx="minor">
+            <a:schemeClr val="tx1"/>
+          </a:fontRef>
+        </p:style>
+      </p:cxnSp>
+      <p:sp>
+        <p:nvSpPr>
+          <p:cNvPr id="100" name="ZoneTexte 99"/>
+          <p:cNvSpPr txBox="1"/>
+          <p:nvPr/>
+        </p:nvSpPr>
+        <p:spPr>
+          <a:xfrm>
+            <a:off x="3627168" y="1925048"/>
+            <a:ext cx="764312" cy="369332"/>
+          </a:xfrm>
+          <a:prstGeom prst="rect">
+            <a:avLst/>
+          </a:prstGeom>
+          <a:noFill/>
+        </p:spPr>
+        <p:txBody>
+          <a:bodyPr wrap="none" rtlCol="0">
+            <a:spAutoFit/>
+          </a:bodyPr>
+          <a:lstStyle/>
+          <a:p>
+            <a:r>
+              <a:rPr lang="fr-FR" dirty="0" err="1"/>
+              <a:t>s</a:t>
+            </a:r>
+            <a:r>
+              <a:rPr lang="fr-FR" dirty="0" err="1" smtClean="0"/>
+              <a:t>ector</a:t>
+            </a:r>
+            <a:endParaRPr lang="fr-FR" dirty="0" smtClean="0"/>
+          </a:p>
+        </p:txBody>
+      </p:sp>
+      <p:cxnSp>
+        <p:nvCxnSpPr>
+          <p:cNvPr id="101" name="Connecteur droit 100"/>
+          <p:cNvCxnSpPr/>
+          <p:nvPr/>
+        </p:nvCxnSpPr>
+        <p:spPr>
+          <a:xfrm rot="10800000">
+            <a:off x="6273563" y="1839355"/>
+            <a:ext cx="495300" cy="0"/>
+          </a:xfrm>
+          <a:prstGeom prst="line">
+            <a:avLst/>
+          </a:prstGeom>
+          <a:ln>
+            <a:solidFill>
+              <a:schemeClr val="tx1"/>
+            </a:solidFill>
+          </a:ln>
+        </p:spPr>
+        <p:style>
+          <a:lnRef idx="1">
+            <a:schemeClr val="accent1"/>
+          </a:lnRef>
+          <a:fillRef idx="0">
+            <a:schemeClr val="accent1"/>
+          </a:fillRef>
+          <a:effectRef idx="0">
+            <a:schemeClr val="accent1"/>
+          </a:effectRef>
+          <a:fontRef idx="minor">
+            <a:schemeClr val="tx1"/>
+          </a:fontRef>
+        </p:style>
+      </p:cxnSp>
+      <p:sp>
+        <p:nvSpPr>
+          <p:cNvPr id="102" name="Ellipse 101"/>
+          <p:cNvSpPr/>
+          <p:nvPr/>
+        </p:nvSpPr>
+        <p:spPr>
+          <a:xfrm rot="2700000">
+            <a:off x="6757382" y="1709060"/>
+            <a:ext cx="252968" cy="252968"/>
+          </a:xfrm>
+          <a:prstGeom prst="ellipse">
+            <a:avLst/>
+          </a:prstGeom>
+          <a:solidFill>
+            <a:schemeClr val="accent6"/>
+          </a:solidFill>
+        </p:spPr>
+        <p:style>
+          <a:lnRef idx="2">
+            <a:schemeClr val="accent1">
+              <a:shade val="50000"/>
+            </a:schemeClr>
+          </a:lnRef>
+          <a:fillRef idx="1">
+            <a:schemeClr val="accent1"/>
+          </a:fillRef>
+          <a:effectRef idx="0">
+            <a:schemeClr val="accent1"/>
+          </a:effectRef>
+          <a:fontRef idx="minor">
+            <a:schemeClr val="lt1"/>
+          </a:fontRef>
+        </p:style>
+        <p:txBody>
+          <a:bodyPr rtlCol="0" anchor="ctr"/>
+          <a:lstStyle/>
+          <a:p>
+            <a:pPr algn="ctr"/>
+            <a:endParaRPr lang="fr-FR"/>
+          </a:p>
+        </p:txBody>
+      </p:sp>
+      <p:cxnSp>
+        <p:nvCxnSpPr>
+          <p:cNvPr id="103" name="Connecteur droit 102"/>
+          <p:cNvCxnSpPr/>
+          <p:nvPr/>
+        </p:nvCxnSpPr>
+        <p:spPr>
+          <a:xfrm rot="-5400000" flipH="1">
+            <a:off x="6937838" y="1947421"/>
+            <a:ext cx="487855" cy="366358"/>
+          </a:xfrm>
+          <a:prstGeom prst="line">
+            <a:avLst/>
+          </a:prstGeom>
+          <a:ln>
+            <a:solidFill>
+              <a:schemeClr val="tx1"/>
+            </a:solidFill>
+          </a:ln>
+        </p:spPr>
+        <p:style>
+          <a:lnRef idx="1">
+            <a:schemeClr val="accent1"/>
+          </a:lnRef>
+          <a:fillRef idx="0">
+            <a:schemeClr val="accent1"/>
+          </a:fillRef>
+          <a:effectRef idx="0">
+            <a:schemeClr val="accent1"/>
+          </a:effectRef>
+          <a:fontRef idx="minor">
+            <a:schemeClr val="tx1"/>
+          </a:fontRef>
+        </p:style>
+      </p:cxnSp>
+      <p:sp>
+        <p:nvSpPr>
+          <p:cNvPr id="104" name="ZoneTexte 103"/>
+          <p:cNvSpPr txBox="1"/>
+          <p:nvPr/>
+        </p:nvSpPr>
+        <p:spPr>
+          <a:xfrm>
+            <a:off x="6968103" y="1646691"/>
+            <a:ext cx="2317366" cy="369332"/>
+          </a:xfrm>
+          <a:prstGeom prst="rect">
+            <a:avLst/>
+          </a:prstGeom>
+          <a:noFill/>
+        </p:spPr>
+        <p:txBody>
+          <a:bodyPr wrap="none" rtlCol="0">
+            <a:spAutoFit/>
+          </a:bodyPr>
+          <a:lstStyle/>
+          <a:p>
+            <a:r>
+              <a:rPr lang="fr-FR" dirty="0" err="1" smtClean="0"/>
+              <a:t>environmentTypeCode</a:t>
+            </a:r>
+            <a:endParaRPr lang="fr-FR" dirty="0"/>
+          </a:p>
+        </p:txBody>
+      </p:sp>
+      <p:sp>
+        <p:nvSpPr>
+          <p:cNvPr id="105" name="ZoneTexte 104"/>
+          <p:cNvSpPr txBox="1"/>
+          <p:nvPr/>
+        </p:nvSpPr>
+        <p:spPr>
+          <a:xfrm>
+            <a:off x="7233011" y="1972617"/>
+            <a:ext cx="2280496" cy="369332"/>
+          </a:xfrm>
+          <a:prstGeom prst="rect">
+            <a:avLst/>
+          </a:prstGeom>
+          <a:noFill/>
+        </p:spPr>
+        <p:txBody>
+          <a:bodyPr wrap="none" rtlCol="0">
+            <a:spAutoFit/>
+          </a:bodyPr>
+          <a:lstStyle/>
+          <a:p>
+            <a:r>
+              <a:rPr lang="fr-FR" dirty="0" err="1" smtClean="0"/>
+              <a:t>environmentTypeDesc</a:t>
+            </a:r>
+            <a:endParaRPr lang="fr-FR" dirty="0" smtClean="0"/>
+          </a:p>
+        </p:txBody>
+      </p:sp>
+      <p:cxnSp>
+        <p:nvCxnSpPr>
+          <p:cNvPr id="106" name="Connecteur droit 105"/>
+          <p:cNvCxnSpPr/>
+          <p:nvPr/>
+        </p:nvCxnSpPr>
+        <p:spPr>
+          <a:xfrm flipH="1">
+            <a:off x="7373965" y="2370554"/>
+            <a:ext cx="1285920" cy="0"/>
+          </a:xfrm>
+          <a:prstGeom prst="line">
+            <a:avLst/>
+          </a:prstGeom>
+          <a:ln>
+            <a:solidFill>
+              <a:schemeClr val="tx1"/>
+            </a:solidFill>
+          </a:ln>
+        </p:spPr>
+        <p:style>
+          <a:lnRef idx="1">
+            <a:schemeClr val="accent1"/>
+          </a:lnRef>
+          <a:fillRef idx="0">
+            <a:schemeClr val="accent1"/>
+          </a:fillRef>
+          <a:effectRef idx="0">
+            <a:schemeClr val="accent1"/>
+          </a:effectRef>
+          <a:fontRef idx="minor">
+            <a:schemeClr val="tx1"/>
+          </a:fontRef>
+        </p:style>
+      </p:cxnSp>
+      <p:sp>
+        <p:nvSpPr>
+          <p:cNvPr id="107" name="Ellipse 106"/>
+          <p:cNvSpPr/>
+          <p:nvPr/>
+        </p:nvSpPr>
+        <p:spPr>
+          <a:xfrm rot="18693875">
+            <a:off x="4906015" y="1021075"/>
+            <a:ext cx="252968" cy="252968"/>
+          </a:xfrm>
+          <a:prstGeom prst="ellipse">
+            <a:avLst/>
+          </a:prstGeom>
+          <a:solidFill>
+            <a:schemeClr val="accent6"/>
+          </a:solidFill>
+        </p:spPr>
+        <p:style>
+          <a:lnRef idx="2">
+            <a:schemeClr val="accent1">
+              <a:shade val="50000"/>
+            </a:schemeClr>
+          </a:lnRef>
+          <a:fillRef idx="1">
+            <a:schemeClr val="accent1"/>
+          </a:fillRef>
+          <a:effectRef idx="0">
+            <a:schemeClr val="accent1"/>
+          </a:effectRef>
+          <a:fontRef idx="minor">
+            <a:schemeClr val="lt1"/>
+          </a:fontRef>
+        </p:style>
+        <p:txBody>
+          <a:bodyPr rtlCol="0" anchor="ctr"/>
+          <a:lstStyle/>
+          <a:p>
+            <a:pPr algn="ctr"/>
+            <a:endParaRPr lang="fr-FR"/>
+          </a:p>
+        </p:txBody>
+      </p:sp>
+      <p:sp>
+        <p:nvSpPr>
+          <p:cNvPr id="108" name="ZoneTexte 107"/>
+          <p:cNvSpPr txBox="1"/>
+          <p:nvPr/>
+        </p:nvSpPr>
+        <p:spPr>
+          <a:xfrm>
+            <a:off x="3164674" y="1298920"/>
+            <a:ext cx="1733231" cy="369332"/>
+          </a:xfrm>
+          <a:prstGeom prst="rect">
+            <a:avLst/>
+          </a:prstGeom>
+          <a:noFill/>
+        </p:spPr>
+        <p:txBody>
+          <a:bodyPr wrap="none" rtlCol="0">
+            <a:spAutoFit/>
+          </a:bodyPr>
+          <a:lstStyle/>
+          <a:p>
+            <a:r>
+              <a:rPr lang="fr-FR" dirty="0" err="1" smtClean="0"/>
+              <a:t>nearTrainStation</a:t>
+            </a:r>
+            <a:endParaRPr lang="fr-FR" dirty="0" smtClean="0"/>
+          </a:p>
+        </p:txBody>
+      </p:sp>
+      <p:sp>
+        <p:nvSpPr>
+          <p:cNvPr id="109" name="Ellipse 108"/>
+          <p:cNvSpPr/>
+          <p:nvPr/>
+        </p:nvSpPr>
+        <p:spPr>
+          <a:xfrm rot="18693875">
+            <a:off x="4858085" y="1719184"/>
+            <a:ext cx="252968" cy="252968"/>
+          </a:xfrm>
+          <a:prstGeom prst="ellipse">
+            <a:avLst/>
+          </a:prstGeom>
+          <a:solidFill>
+            <a:schemeClr val="accent6"/>
+          </a:solidFill>
+        </p:spPr>
+        <p:style>
+          <a:lnRef idx="2">
+            <a:schemeClr val="accent1">
+              <a:shade val="50000"/>
+            </a:schemeClr>
+          </a:lnRef>
+          <a:fillRef idx="1">
+            <a:schemeClr val="accent1"/>
+          </a:fillRef>
+          <a:effectRef idx="0">
+            <a:schemeClr val="accent1"/>
+          </a:effectRef>
+          <a:fontRef idx="minor">
+            <a:schemeClr val="lt1"/>
+          </a:fontRef>
+        </p:style>
+        <p:txBody>
+          <a:bodyPr rtlCol="0" anchor="ctr"/>
+          <a:lstStyle/>
+          <a:p>
+            <a:pPr algn="ctr"/>
+            <a:endParaRPr lang="fr-FR"/>
+          </a:p>
+        </p:txBody>
+      </p:sp>
+      <p:sp>
+        <p:nvSpPr>
+          <p:cNvPr id="110" name="Ellipse 109"/>
+          <p:cNvSpPr/>
+          <p:nvPr/>
+        </p:nvSpPr>
+        <p:spPr>
+          <a:xfrm rot="18693875">
+            <a:off x="4168635" y="1724145"/>
+            <a:ext cx="252968" cy="252968"/>
+          </a:xfrm>
+          <a:prstGeom prst="ellipse">
+            <a:avLst/>
+          </a:prstGeom>
+          <a:solidFill>
+            <a:schemeClr val="accent6"/>
+          </a:solidFill>
+        </p:spPr>
+        <p:style>
+          <a:lnRef idx="2">
+            <a:schemeClr val="accent1">
+              <a:shade val="50000"/>
+            </a:schemeClr>
+          </a:lnRef>
+          <a:fillRef idx="1">
+            <a:schemeClr val="accent1"/>
+          </a:fillRef>
+          <a:effectRef idx="0">
+            <a:schemeClr val="accent1"/>
+          </a:effectRef>
+          <a:fontRef idx="minor">
+            <a:schemeClr val="lt1"/>
+          </a:fontRef>
+        </p:style>
+        <p:txBody>
+          <a:bodyPr rtlCol="0" anchor="ctr"/>
+          <a:lstStyle/>
+          <a:p>
+            <a:pPr algn="ctr"/>
+            <a:endParaRPr lang="fr-FR"/>
+          </a:p>
+        </p:txBody>
+      </p:sp>
+      <p:cxnSp>
+        <p:nvCxnSpPr>
+          <p:cNvPr id="111" name="Connecteur droit 110"/>
+          <p:cNvCxnSpPr/>
+          <p:nvPr/>
+        </p:nvCxnSpPr>
+        <p:spPr>
+          <a:xfrm>
+            <a:off x="5064076" y="1543518"/>
+            <a:ext cx="495300" cy="0"/>
+          </a:xfrm>
+          <a:prstGeom prst="line">
+            <a:avLst/>
+          </a:prstGeom>
+          <a:ln>
+            <a:solidFill>
+              <a:schemeClr val="tx1"/>
+            </a:solidFill>
+          </a:ln>
+        </p:spPr>
+        <p:style>
+          <a:lnRef idx="1">
+            <a:schemeClr val="accent1"/>
+          </a:lnRef>
+          <a:fillRef idx="0">
+            <a:schemeClr val="accent1"/>
+          </a:fillRef>
+          <a:effectRef idx="0">
+            <a:schemeClr val="accent1"/>
+          </a:effectRef>
+          <a:fontRef idx="minor">
+            <a:schemeClr val="tx1"/>
+          </a:fontRef>
+        </p:style>
+      </p:cxnSp>
+      <p:cxnSp>
+        <p:nvCxnSpPr>
+          <p:cNvPr id="112" name="Connecteur droit 111"/>
+          <p:cNvCxnSpPr/>
+          <p:nvPr/>
+        </p:nvCxnSpPr>
+        <p:spPr>
+          <a:xfrm>
+            <a:off x="6421166" y="1517977"/>
+            <a:ext cx="495300" cy="0"/>
+          </a:xfrm>
+          <a:prstGeom prst="line">
+            <a:avLst/>
+          </a:prstGeom>
+          <a:ln>
+            <a:solidFill>
+              <a:schemeClr val="tx1"/>
+            </a:solidFill>
+          </a:ln>
+        </p:spPr>
+        <p:style>
+          <a:lnRef idx="1">
+            <a:schemeClr val="accent1"/>
+          </a:lnRef>
+          <a:fillRef idx="0">
+            <a:schemeClr val="accent1"/>
+          </a:fillRef>
+          <a:effectRef idx="0">
+            <a:schemeClr val="accent1"/>
+          </a:effectRef>
+          <a:fontRef idx="minor">
+            <a:schemeClr val="tx1"/>
+          </a:fontRef>
+        </p:style>
+      </p:cxnSp>
+      <p:cxnSp>
+        <p:nvCxnSpPr>
+          <p:cNvPr id="113" name="Connecteur droit 112"/>
+          <p:cNvCxnSpPr/>
+          <p:nvPr/>
+        </p:nvCxnSpPr>
+        <p:spPr>
+          <a:xfrm rot="5400000">
+            <a:off x="5742621" y="830045"/>
+            <a:ext cx="495300" cy="0"/>
+          </a:xfrm>
+          <a:prstGeom prst="line">
+            <a:avLst/>
+          </a:prstGeom>
+          <a:ln>
+            <a:solidFill>
+              <a:schemeClr val="tx1"/>
+            </a:solidFill>
+          </a:ln>
+        </p:spPr>
+        <p:style>
+          <a:lnRef idx="1">
+            <a:schemeClr val="accent1"/>
+          </a:lnRef>
+          <a:fillRef idx="0">
+            <a:schemeClr val="accent1"/>
+          </a:fillRef>
+          <a:effectRef idx="0">
+            <a:schemeClr val="accent1"/>
+          </a:effectRef>
+          <a:fontRef idx="minor">
+            <a:schemeClr val="tx1"/>
+          </a:fontRef>
+        </p:style>
+      </p:cxnSp>
+      <p:cxnSp>
+        <p:nvCxnSpPr>
+          <p:cNvPr id="114" name="Connecteur droit 113"/>
+          <p:cNvCxnSpPr/>
+          <p:nvPr/>
+        </p:nvCxnSpPr>
+        <p:spPr>
+          <a:xfrm rot="1320000">
+            <a:off x="5094809" y="1320734"/>
+            <a:ext cx="495300" cy="0"/>
+          </a:xfrm>
+          <a:prstGeom prst="line">
+            <a:avLst/>
+          </a:prstGeom>
+          <a:ln>
+            <a:solidFill>
+              <a:schemeClr val="tx1"/>
+            </a:solidFill>
+          </a:ln>
+        </p:spPr>
+        <p:style>
+          <a:lnRef idx="1">
+            <a:schemeClr val="accent1"/>
+          </a:lnRef>
+          <a:fillRef idx="0">
+            <a:schemeClr val="accent1"/>
+          </a:fillRef>
+          <a:effectRef idx="0">
+            <a:schemeClr val="accent1"/>
+          </a:effectRef>
+          <a:fontRef idx="minor">
+            <a:schemeClr val="tx1"/>
+          </a:fontRef>
+        </p:style>
+      </p:cxnSp>
+      <p:cxnSp>
+        <p:nvCxnSpPr>
+          <p:cNvPr id="115" name="Connecteur droit 114"/>
+          <p:cNvCxnSpPr/>
+          <p:nvPr/>
+        </p:nvCxnSpPr>
+        <p:spPr>
+          <a:xfrm rot="2700000">
+            <a:off x="5228417" y="1078993"/>
+            <a:ext cx="495300" cy="0"/>
+          </a:xfrm>
+          <a:prstGeom prst="line">
+            <a:avLst/>
+          </a:prstGeom>
+          <a:ln>
+            <a:solidFill>
+              <a:schemeClr val="tx1"/>
+            </a:solidFill>
+          </a:ln>
+        </p:spPr>
+        <p:style>
+          <a:lnRef idx="1">
+            <a:schemeClr val="accent1"/>
+          </a:lnRef>
+          <a:fillRef idx="0">
+            <a:schemeClr val="accent1"/>
+          </a:fillRef>
+          <a:effectRef idx="0">
+            <a:schemeClr val="accent1"/>
+          </a:effectRef>
+          <a:fontRef idx="minor">
+            <a:schemeClr val="tx1"/>
+          </a:fontRef>
+        </p:style>
+      </p:cxnSp>
+      <p:cxnSp>
+        <p:nvCxnSpPr>
+          <p:cNvPr id="116" name="Connecteur droit 115"/>
+          <p:cNvCxnSpPr/>
+          <p:nvPr/>
+        </p:nvCxnSpPr>
+        <p:spPr>
+          <a:xfrm rot="4680000">
+            <a:off x="5489695" y="898934"/>
+            <a:ext cx="495300" cy="0"/>
+          </a:xfrm>
+          <a:prstGeom prst="line">
+            <a:avLst/>
+          </a:prstGeom>
+          <a:ln>
+            <a:solidFill>
+              <a:schemeClr val="tx1"/>
+            </a:solidFill>
+          </a:ln>
+        </p:spPr>
+        <p:style>
+          <a:lnRef idx="1">
+            <a:schemeClr val="accent1"/>
+          </a:lnRef>
+          <a:fillRef idx="0">
+            <a:schemeClr val="accent1"/>
+          </a:fillRef>
+          <a:effectRef idx="0">
+            <a:schemeClr val="accent1"/>
+          </a:effectRef>
+          <a:fontRef idx="minor">
+            <a:schemeClr val="tx1"/>
+          </a:fontRef>
+        </p:style>
+      </p:cxnSp>
+      <p:sp>
+        <p:nvSpPr>
+          <p:cNvPr id="117" name="Ellipse 116"/>
+          <p:cNvSpPr/>
+          <p:nvPr/>
+        </p:nvSpPr>
+        <p:spPr>
+          <a:xfrm rot="18693875">
+            <a:off x="5174468" y="742573"/>
+            <a:ext cx="252968" cy="252968"/>
+          </a:xfrm>
+          <a:prstGeom prst="ellipse">
+            <a:avLst/>
+          </a:prstGeom>
+          <a:solidFill>
+            <a:schemeClr val="accent6"/>
+          </a:solidFill>
+        </p:spPr>
+        <p:style>
+          <a:lnRef idx="2">
+            <a:schemeClr val="accent1">
+              <a:shade val="50000"/>
+            </a:schemeClr>
+          </a:lnRef>
+          <a:fillRef idx="1">
+            <a:schemeClr val="accent1"/>
+          </a:fillRef>
+          <a:effectRef idx="0">
+            <a:schemeClr val="accent1"/>
+          </a:effectRef>
+          <a:fontRef idx="minor">
+            <a:schemeClr val="lt1"/>
+          </a:fontRef>
+        </p:style>
+        <p:txBody>
+          <a:bodyPr rtlCol="0" anchor="ctr"/>
+          <a:lstStyle/>
+          <a:p>
+            <a:pPr algn="ctr"/>
+            <a:endParaRPr lang="fr-FR"/>
+          </a:p>
+        </p:txBody>
+      </p:sp>
+      <p:sp>
+        <p:nvSpPr>
+          <p:cNvPr id="118" name="Ellipse 117"/>
+          <p:cNvSpPr/>
+          <p:nvPr/>
+        </p:nvSpPr>
+        <p:spPr>
+          <a:xfrm rot="18693875">
+            <a:off x="5528663" y="451178"/>
+            <a:ext cx="252968" cy="252968"/>
+          </a:xfrm>
+          <a:prstGeom prst="ellipse">
+            <a:avLst/>
+          </a:prstGeom>
+          <a:solidFill>
+            <a:schemeClr val="accent6"/>
+          </a:solidFill>
+        </p:spPr>
+        <p:style>
+          <a:lnRef idx="2">
+            <a:schemeClr val="accent1">
+              <a:shade val="50000"/>
+            </a:schemeClr>
+          </a:lnRef>
+          <a:fillRef idx="1">
+            <a:schemeClr val="accent1"/>
+          </a:fillRef>
+          <a:effectRef idx="0">
+            <a:schemeClr val="accent1"/>
+          </a:effectRef>
+          <a:fontRef idx="minor">
+            <a:schemeClr val="lt1"/>
+          </a:fontRef>
+        </p:style>
+        <p:txBody>
+          <a:bodyPr rtlCol="0" anchor="ctr"/>
+          <a:lstStyle/>
+          <a:p>
+            <a:pPr algn="ctr"/>
+            <a:endParaRPr lang="fr-FR"/>
+          </a:p>
+        </p:txBody>
+      </p:sp>
+      <p:sp>
+        <p:nvSpPr>
+          <p:cNvPr id="119" name="Ellipse 118"/>
+          <p:cNvSpPr/>
+          <p:nvPr/>
+        </p:nvSpPr>
+        <p:spPr>
+          <a:xfrm rot="18693875">
+            <a:off x="5877359" y="383898"/>
+            <a:ext cx="252968" cy="252968"/>
+          </a:xfrm>
+          <a:prstGeom prst="ellipse">
+            <a:avLst/>
+          </a:prstGeom>
+          <a:solidFill>
+            <a:schemeClr val="accent6"/>
+          </a:solidFill>
+        </p:spPr>
+        <p:style>
+          <a:lnRef idx="2">
+            <a:schemeClr val="accent1">
+              <a:shade val="50000"/>
+            </a:schemeClr>
+          </a:lnRef>
+          <a:fillRef idx="1">
+            <a:schemeClr val="accent1"/>
+          </a:fillRef>
+          <a:effectRef idx="0">
+            <a:schemeClr val="accent1"/>
+          </a:effectRef>
+          <a:fontRef idx="minor">
+            <a:schemeClr val="lt1"/>
+          </a:fontRef>
+        </p:style>
+        <p:txBody>
+          <a:bodyPr rtlCol="0" anchor="ctr"/>
+          <a:lstStyle/>
+          <a:p>
+            <a:pPr algn="ctr"/>
+            <a:endParaRPr lang="fr-FR"/>
+          </a:p>
+        </p:txBody>
+      </p:sp>
+      <p:sp>
+        <p:nvSpPr>
+          <p:cNvPr id="120" name="Ellipse 119"/>
+          <p:cNvSpPr/>
+          <p:nvPr/>
+        </p:nvSpPr>
+        <p:spPr>
+          <a:xfrm rot="18693875">
+            <a:off x="4843149" y="1403167"/>
+            <a:ext cx="252968" cy="252968"/>
+          </a:xfrm>
+          <a:prstGeom prst="ellipse">
+            <a:avLst/>
+          </a:prstGeom>
+          <a:solidFill>
+            <a:schemeClr val="accent6"/>
+          </a:solidFill>
+        </p:spPr>
+        <p:style>
+          <a:lnRef idx="2">
+            <a:schemeClr val="accent1">
+              <a:shade val="50000"/>
+            </a:schemeClr>
+          </a:lnRef>
+          <a:fillRef idx="1">
+            <a:schemeClr val="accent1"/>
+          </a:fillRef>
+          <a:effectRef idx="0">
+            <a:schemeClr val="accent1"/>
+          </a:effectRef>
+          <a:fontRef idx="minor">
+            <a:schemeClr val="lt1"/>
+          </a:fontRef>
+        </p:style>
+        <p:txBody>
+          <a:bodyPr rtlCol="0" anchor="ctr"/>
+          <a:lstStyle/>
+          <a:p>
+            <a:pPr algn="ctr"/>
+            <a:endParaRPr lang="fr-FR"/>
+          </a:p>
+        </p:txBody>
+      </p:sp>
+      <p:sp>
+        <p:nvSpPr>
+          <p:cNvPr id="121" name="ZoneTexte 120"/>
+          <p:cNvSpPr txBox="1"/>
+          <p:nvPr/>
+        </p:nvSpPr>
+        <p:spPr>
+          <a:xfrm>
+            <a:off x="3491154" y="913034"/>
+            <a:ext cx="1378904" cy="369332"/>
+          </a:xfrm>
+          <a:prstGeom prst="rect">
+            <a:avLst/>
+          </a:prstGeom>
+          <a:noFill/>
+        </p:spPr>
+        <p:txBody>
+          <a:bodyPr wrap="none" rtlCol="0">
+            <a:spAutoFit/>
+          </a:bodyPr>
+          <a:lstStyle/>
+          <a:p>
+            <a:r>
+              <a:rPr lang="fr-FR" dirty="0" err="1" smtClean="0"/>
+              <a:t>nearHeliport</a:t>
+            </a:r>
+            <a:endParaRPr lang="fr-FR" dirty="0" smtClean="0"/>
+          </a:p>
+        </p:txBody>
+      </p:sp>
+      <p:sp>
+        <p:nvSpPr>
+          <p:cNvPr id="122" name="ZoneTexte 121"/>
+          <p:cNvSpPr txBox="1"/>
+          <p:nvPr/>
+        </p:nvSpPr>
+        <p:spPr>
+          <a:xfrm>
+            <a:off x="3924634" y="515717"/>
+            <a:ext cx="1197764" cy="369332"/>
+          </a:xfrm>
+          <a:prstGeom prst="rect">
+            <a:avLst/>
+          </a:prstGeom>
+          <a:noFill/>
+        </p:spPr>
+        <p:txBody>
+          <a:bodyPr wrap="none" rtlCol="0">
+            <a:spAutoFit/>
+          </a:bodyPr>
+          <a:lstStyle/>
+          <a:p>
+            <a:r>
+              <a:rPr lang="fr-FR" dirty="0" err="1" smtClean="0"/>
+              <a:t>nearPlaces</a:t>
+            </a:r>
+            <a:endParaRPr lang="fr-FR" dirty="0" smtClean="0"/>
+          </a:p>
+        </p:txBody>
+      </p:sp>
+      <p:sp>
+        <p:nvSpPr>
+          <p:cNvPr id="123" name="ZoneTexte 122"/>
+          <p:cNvSpPr txBox="1"/>
+          <p:nvPr/>
+        </p:nvSpPr>
+        <p:spPr>
+          <a:xfrm>
+            <a:off x="3593075" y="201038"/>
+            <a:ext cx="1959767" cy="369332"/>
+          </a:xfrm>
+          <a:prstGeom prst="rect">
+            <a:avLst/>
+          </a:prstGeom>
+          <a:noFill/>
+        </p:spPr>
+        <p:txBody>
+          <a:bodyPr wrap="none" rtlCol="0">
+            <a:spAutoFit/>
+          </a:bodyPr>
+          <a:lstStyle/>
+          <a:p>
+            <a:r>
+              <a:rPr lang="fr-FR" dirty="0" err="1" smtClean="0"/>
+              <a:t>nearIndustrialZone</a:t>
+            </a:r>
+            <a:endParaRPr lang="fr-FR" dirty="0" smtClean="0"/>
+          </a:p>
+        </p:txBody>
+      </p:sp>
+      <p:sp>
+        <p:nvSpPr>
+          <p:cNvPr id="124" name="ZoneTexte 123"/>
+          <p:cNvSpPr txBox="1"/>
+          <p:nvPr/>
+        </p:nvSpPr>
+        <p:spPr>
+          <a:xfrm>
+            <a:off x="5401725" y="14285"/>
+            <a:ext cx="1305037" cy="369332"/>
+          </a:xfrm>
+          <a:prstGeom prst="rect">
+            <a:avLst/>
+          </a:prstGeom>
+          <a:noFill/>
+        </p:spPr>
+        <p:txBody>
+          <a:bodyPr wrap="none" rtlCol="0">
+            <a:spAutoFit/>
+          </a:bodyPr>
+          <a:lstStyle/>
+          <a:p>
+            <a:r>
+              <a:rPr lang="fr-FR" dirty="0" err="1" smtClean="0"/>
+              <a:t>nearParking</a:t>
+            </a:r>
+            <a:endParaRPr lang="fr-FR" dirty="0" smtClean="0"/>
+          </a:p>
+        </p:txBody>
+      </p:sp>
+      <p:cxnSp>
+        <p:nvCxnSpPr>
+          <p:cNvPr id="125" name="Connecteur droit 124"/>
+          <p:cNvCxnSpPr/>
+          <p:nvPr/>
+        </p:nvCxnSpPr>
+        <p:spPr>
+          <a:xfrm rot="-4680000">
+            <a:off x="6046428" y="922632"/>
+            <a:ext cx="495300" cy="0"/>
+          </a:xfrm>
+          <a:prstGeom prst="line">
+            <a:avLst/>
+          </a:prstGeom>
+          <a:ln>
+            <a:solidFill>
+              <a:schemeClr val="tx1"/>
+            </a:solidFill>
+          </a:ln>
+        </p:spPr>
+        <p:style>
+          <a:lnRef idx="1">
+            <a:schemeClr val="accent1"/>
+          </a:lnRef>
+          <a:fillRef idx="0">
+            <a:schemeClr val="accent1"/>
+          </a:fillRef>
+          <a:effectRef idx="0">
+            <a:schemeClr val="accent1"/>
+          </a:effectRef>
+          <a:fontRef idx="minor">
+            <a:schemeClr val="tx1"/>
+          </a:fontRef>
+        </p:style>
+      </p:cxnSp>
+      <p:cxnSp>
+        <p:nvCxnSpPr>
+          <p:cNvPr id="126" name="Connecteur droit 125"/>
+          <p:cNvCxnSpPr/>
+          <p:nvPr/>
+        </p:nvCxnSpPr>
+        <p:spPr>
+          <a:xfrm rot="-2700000">
+            <a:off x="6281466" y="1111577"/>
+            <a:ext cx="495300" cy="0"/>
+          </a:xfrm>
+          <a:prstGeom prst="line">
+            <a:avLst/>
+          </a:prstGeom>
+          <a:ln>
+            <a:solidFill>
+              <a:schemeClr val="tx1"/>
+            </a:solidFill>
+          </a:ln>
+        </p:spPr>
+        <p:style>
+          <a:lnRef idx="1">
+            <a:schemeClr val="accent1"/>
+          </a:lnRef>
+          <a:fillRef idx="0">
+            <a:schemeClr val="accent1"/>
+          </a:fillRef>
+          <a:effectRef idx="0">
+            <a:schemeClr val="accent1"/>
+          </a:effectRef>
+          <a:fontRef idx="minor">
+            <a:schemeClr val="tx1"/>
+          </a:fontRef>
+        </p:style>
+      </p:cxnSp>
+      <p:cxnSp>
+        <p:nvCxnSpPr>
+          <p:cNvPr id="127" name="Connecteur droit 126"/>
+          <p:cNvCxnSpPr/>
+          <p:nvPr/>
+        </p:nvCxnSpPr>
+        <p:spPr>
+          <a:xfrm rot="-1320000">
+            <a:off x="6383066" y="1327477"/>
+            <a:ext cx="495300" cy="0"/>
+          </a:xfrm>
+          <a:prstGeom prst="line">
+            <a:avLst/>
+          </a:prstGeom>
+          <a:ln>
+            <a:solidFill>
+              <a:schemeClr val="tx1"/>
+            </a:solidFill>
+          </a:ln>
+        </p:spPr>
+        <p:style>
+          <a:lnRef idx="1">
+            <a:schemeClr val="accent1"/>
+          </a:lnRef>
+          <a:fillRef idx="0">
+            <a:schemeClr val="accent1"/>
+          </a:fillRef>
+          <a:effectRef idx="0">
+            <a:schemeClr val="accent1"/>
+          </a:effectRef>
+          <a:fontRef idx="minor">
+            <a:schemeClr val="tx1"/>
+          </a:fontRef>
+        </p:style>
+      </p:cxnSp>
+      <p:sp>
+        <p:nvSpPr>
+          <p:cNvPr id="128" name="Ellipse 127"/>
+          <p:cNvSpPr/>
+          <p:nvPr/>
+        </p:nvSpPr>
+        <p:spPr>
+          <a:xfrm rot="18693875">
+            <a:off x="6270921" y="487380"/>
+            <a:ext cx="252968" cy="252968"/>
+          </a:xfrm>
+          <a:prstGeom prst="ellipse">
+            <a:avLst/>
+          </a:prstGeom>
+          <a:solidFill>
+            <a:schemeClr val="accent6"/>
+          </a:solidFill>
+        </p:spPr>
+        <p:style>
+          <a:lnRef idx="2">
+            <a:schemeClr val="accent1">
+              <a:shade val="50000"/>
+            </a:schemeClr>
+          </a:lnRef>
+          <a:fillRef idx="1">
+            <a:schemeClr val="accent1"/>
+          </a:fillRef>
+          <a:effectRef idx="0">
+            <a:schemeClr val="accent1"/>
+          </a:effectRef>
+          <a:fontRef idx="minor">
+            <a:schemeClr val="lt1"/>
+          </a:fontRef>
+        </p:style>
+        <p:txBody>
+          <a:bodyPr rtlCol="0" anchor="ctr"/>
+          <a:lstStyle/>
+          <a:p>
+            <a:pPr algn="ctr"/>
+            <a:endParaRPr lang="fr-FR"/>
+          </a:p>
+        </p:txBody>
+      </p:sp>
+      <p:sp>
+        <p:nvSpPr>
+          <p:cNvPr id="129" name="Ellipse 128"/>
+          <p:cNvSpPr/>
+          <p:nvPr/>
+        </p:nvSpPr>
+        <p:spPr>
+          <a:xfrm rot="18693875">
+            <a:off x="6611428" y="714852"/>
+            <a:ext cx="252968" cy="252968"/>
+          </a:xfrm>
+          <a:prstGeom prst="ellipse">
+            <a:avLst/>
+          </a:prstGeom>
+          <a:solidFill>
+            <a:schemeClr val="accent6"/>
+          </a:solidFill>
+        </p:spPr>
+        <p:style>
+          <a:lnRef idx="2">
+            <a:schemeClr val="accent1">
+              <a:shade val="50000"/>
+            </a:schemeClr>
+          </a:lnRef>
+          <a:fillRef idx="1">
+            <a:schemeClr val="accent1"/>
+          </a:fillRef>
+          <a:effectRef idx="0">
+            <a:schemeClr val="accent1"/>
+          </a:effectRef>
+          <a:fontRef idx="minor">
+            <a:schemeClr val="lt1"/>
+          </a:fontRef>
+        </p:style>
+        <p:txBody>
+          <a:bodyPr rtlCol="0" anchor="ctr"/>
+          <a:lstStyle/>
+          <a:p>
+            <a:pPr algn="ctr"/>
+            <a:endParaRPr lang="fr-FR"/>
+          </a:p>
+        </p:txBody>
+      </p:sp>
+      <p:sp>
+        <p:nvSpPr>
+          <p:cNvPr id="130" name="Ellipse 129"/>
+          <p:cNvSpPr/>
+          <p:nvPr/>
+        </p:nvSpPr>
+        <p:spPr>
+          <a:xfrm rot="18693875">
+            <a:off x="6825663" y="1069504"/>
+            <a:ext cx="252968" cy="252968"/>
+          </a:xfrm>
+          <a:prstGeom prst="ellipse">
+            <a:avLst/>
+          </a:prstGeom>
+          <a:solidFill>
+            <a:schemeClr val="accent6"/>
+          </a:solidFill>
+        </p:spPr>
+        <p:style>
+          <a:lnRef idx="2">
+            <a:schemeClr val="accent1">
+              <a:shade val="50000"/>
+            </a:schemeClr>
+          </a:lnRef>
+          <a:fillRef idx="1">
+            <a:schemeClr val="accent1"/>
+          </a:fillRef>
+          <a:effectRef idx="0">
+            <a:schemeClr val="accent1"/>
+          </a:effectRef>
+          <a:fontRef idx="minor">
+            <a:schemeClr val="lt1"/>
+          </a:fontRef>
+        </p:style>
+        <p:txBody>
+          <a:bodyPr rtlCol="0" anchor="ctr"/>
+          <a:lstStyle/>
+          <a:p>
+            <a:pPr algn="ctr"/>
+            <a:endParaRPr lang="fr-FR"/>
+          </a:p>
+        </p:txBody>
+      </p:sp>
+      <p:sp>
+        <p:nvSpPr>
+          <p:cNvPr id="131" name="Ellipse 130"/>
+          <p:cNvSpPr/>
+          <p:nvPr/>
+        </p:nvSpPr>
+        <p:spPr>
+          <a:xfrm rot="18693875">
+            <a:off x="6841619" y="1401964"/>
+            <a:ext cx="252968" cy="252968"/>
+          </a:xfrm>
+          <a:prstGeom prst="ellipse">
+            <a:avLst/>
+          </a:prstGeom>
+          <a:solidFill>
+            <a:schemeClr val="accent6"/>
+          </a:solidFill>
+        </p:spPr>
+        <p:style>
+          <a:lnRef idx="2">
+            <a:schemeClr val="accent1">
+              <a:shade val="50000"/>
+            </a:schemeClr>
+          </a:lnRef>
+          <a:fillRef idx="1">
+            <a:schemeClr val="accent1"/>
+          </a:fillRef>
+          <a:effectRef idx="0">
+            <a:schemeClr val="accent1"/>
+          </a:effectRef>
+          <a:fontRef idx="minor">
+            <a:schemeClr val="lt1"/>
+          </a:fontRef>
+        </p:style>
+        <p:txBody>
+          <a:bodyPr rtlCol="0" anchor="ctr"/>
+          <a:lstStyle/>
+          <a:p>
+            <a:pPr algn="ctr"/>
+            <a:endParaRPr lang="fr-FR"/>
+          </a:p>
+        </p:txBody>
+      </p:sp>
+      <p:sp>
+        <p:nvSpPr>
+          <p:cNvPr id="132" name="ZoneTexte 131"/>
+          <p:cNvSpPr txBox="1"/>
+          <p:nvPr/>
+        </p:nvSpPr>
+        <p:spPr>
+          <a:xfrm>
+            <a:off x="6460905" y="219186"/>
+            <a:ext cx="1088118" cy="369332"/>
+          </a:xfrm>
+          <a:prstGeom prst="rect">
+            <a:avLst/>
+          </a:prstGeom>
+          <a:noFill/>
+        </p:spPr>
+        <p:txBody>
+          <a:bodyPr wrap="none" rtlCol="0">
+            <a:spAutoFit/>
+          </a:bodyPr>
+          <a:lstStyle/>
+          <a:p>
+            <a:r>
+              <a:rPr lang="fr-FR" dirty="0" err="1" smtClean="0"/>
+              <a:t>nearR</a:t>
+            </a:r>
+            <a:r>
+              <a:rPr lang="fr-FR" dirty="0" err="1" smtClean="0"/>
+              <a:t>iver</a:t>
+            </a:r>
+            <a:endParaRPr lang="fr-FR" dirty="0"/>
+          </a:p>
+        </p:txBody>
+      </p:sp>
+      <p:sp>
+        <p:nvSpPr>
+          <p:cNvPr id="133" name="ZoneTexte 132"/>
+          <p:cNvSpPr txBox="1"/>
+          <p:nvPr/>
+        </p:nvSpPr>
+        <p:spPr>
+          <a:xfrm>
+            <a:off x="6789549" y="546402"/>
+            <a:ext cx="1670265" cy="369332"/>
+          </a:xfrm>
+          <a:prstGeom prst="rect">
+            <a:avLst/>
+          </a:prstGeom>
+          <a:noFill/>
+        </p:spPr>
+        <p:txBody>
+          <a:bodyPr wrap="none" rtlCol="0">
+            <a:spAutoFit/>
+          </a:bodyPr>
+          <a:lstStyle/>
+          <a:p>
+            <a:r>
+              <a:rPr lang="fr-FR" dirty="0" err="1" smtClean="0"/>
+              <a:t>nearMotorway</a:t>
+            </a:r>
+            <a:r>
+              <a:rPr lang="fr-FR" dirty="0" err="1" smtClean="0"/>
+              <a:t>s</a:t>
+            </a:r>
+            <a:endParaRPr lang="fr-FR" dirty="0" smtClean="0"/>
+          </a:p>
+        </p:txBody>
+      </p:sp>
+      <p:sp>
+        <p:nvSpPr>
+          <p:cNvPr id="134" name="ZoneTexte 133"/>
+          <p:cNvSpPr txBox="1"/>
+          <p:nvPr/>
+        </p:nvSpPr>
+        <p:spPr>
+          <a:xfrm>
+            <a:off x="7032831" y="939707"/>
+            <a:ext cx="1026243" cy="369332"/>
+          </a:xfrm>
+          <a:prstGeom prst="rect">
+            <a:avLst/>
+          </a:prstGeom>
+          <a:noFill/>
+        </p:spPr>
+        <p:txBody>
+          <a:bodyPr wrap="none" rtlCol="0">
+            <a:spAutoFit/>
+          </a:bodyPr>
+          <a:lstStyle/>
+          <a:p>
+            <a:r>
+              <a:rPr lang="fr-FR" dirty="0" err="1" smtClean="0"/>
+              <a:t>nearMall</a:t>
+            </a:r>
+            <a:endParaRPr lang="fr-FR" dirty="0" smtClean="0"/>
+          </a:p>
+        </p:txBody>
+      </p:sp>
+      <p:sp>
+        <p:nvSpPr>
+          <p:cNvPr id="135" name="ZoneTexte 134"/>
+          <p:cNvSpPr txBox="1"/>
+          <p:nvPr/>
+        </p:nvSpPr>
+        <p:spPr>
+          <a:xfrm>
+            <a:off x="7048517" y="1319016"/>
+            <a:ext cx="1176989" cy="369332"/>
+          </a:xfrm>
+          <a:prstGeom prst="rect">
+            <a:avLst/>
+          </a:prstGeom>
+          <a:noFill/>
+        </p:spPr>
+        <p:txBody>
+          <a:bodyPr wrap="none" rtlCol="0">
+            <a:spAutoFit/>
+          </a:bodyPr>
+          <a:lstStyle/>
+          <a:p>
+            <a:r>
+              <a:rPr lang="fr-FR" dirty="0" err="1" smtClean="0"/>
+              <a:t>nearRoads</a:t>
+            </a:r>
+            <a:endParaRPr lang="fr-FR" dirty="0" smtClean="0"/>
+          </a:p>
+        </p:txBody>
+      </p:sp>
     </p:spTree>
     <p:extLst>
       <p:ext uri="{BB962C8B-B14F-4D97-AF65-F5344CB8AC3E}">

</xml_diff>

<commit_message>
update df-model + star and snowflake schemas
</commit_message>
<xml_diff>
--- a/df-model/df-model.pptx
+++ b/df-model/df-model.pptx
@@ -107,7 +107,7 @@
   </p:defaultTextStyle>
   <p:extLst>
     <p:ext uri="{EFAFB233-063F-42B5-8137-9DF3F51BA10A}">
-      <p15:sldGuideLst xmlns:p15="http://schemas.microsoft.com/office/powerpoint/2012/main" xmlns="">
+      <p15:sldGuideLst xmlns="" xmlns:p15="http://schemas.microsoft.com/office/powerpoint/2012/main">
         <p15:guide id="1" orient="horz" pos="2160">
           <p15:clr>
             <a:srgbClr val="A4A3A4"/>
@@ -256,7 +256,7 @@
             <a:fld id="{E90F2C70-D7C5-4A11-BAB2-648D55629A91}" type="datetimeFigureOut">
               <a:rPr lang="fr-FR" smtClean="0"/>
               <a:pPr/>
-              <a:t>17/11/2017</a:t>
+              <a:t>20/11/2017</a:t>
             </a:fld>
             <a:endParaRPr lang="fr-FR"/>
           </a:p>
@@ -308,7 +308,7 @@
     </p:spTree>
     <p:extLst>
       <p:ext uri="{BB962C8B-B14F-4D97-AF65-F5344CB8AC3E}">
-        <p14:creationId xmlns:p14="http://schemas.microsoft.com/office/powerpoint/2010/main" xmlns="" val="26437346"/>
+        <p14:creationId xmlns="" xmlns:p14="http://schemas.microsoft.com/office/powerpoint/2010/main" val="26437346"/>
       </p:ext>
     </p:extLst>
   </p:cSld>
@@ -428,7 +428,7 @@
             <a:fld id="{E90F2C70-D7C5-4A11-BAB2-648D55629A91}" type="datetimeFigureOut">
               <a:rPr lang="fr-FR" smtClean="0"/>
               <a:pPr/>
-              <a:t>17/11/2017</a:t>
+              <a:t>20/11/2017</a:t>
             </a:fld>
             <a:endParaRPr lang="fr-FR"/>
           </a:p>
@@ -480,7 +480,7 @@
     </p:spTree>
     <p:extLst>
       <p:ext uri="{BB962C8B-B14F-4D97-AF65-F5344CB8AC3E}">
-        <p14:creationId xmlns:p14="http://schemas.microsoft.com/office/powerpoint/2010/main" xmlns="" val="3002800163"/>
+        <p14:creationId xmlns="" xmlns:p14="http://schemas.microsoft.com/office/powerpoint/2010/main" val="3002800163"/>
       </p:ext>
     </p:extLst>
   </p:cSld>
@@ -610,7 +610,7 @@
             <a:fld id="{E90F2C70-D7C5-4A11-BAB2-648D55629A91}" type="datetimeFigureOut">
               <a:rPr lang="fr-FR" smtClean="0"/>
               <a:pPr/>
-              <a:t>17/11/2017</a:t>
+              <a:t>20/11/2017</a:t>
             </a:fld>
             <a:endParaRPr lang="fr-FR"/>
           </a:p>
@@ -662,7 +662,7 @@
     </p:spTree>
     <p:extLst>
       <p:ext uri="{BB962C8B-B14F-4D97-AF65-F5344CB8AC3E}">
-        <p14:creationId xmlns:p14="http://schemas.microsoft.com/office/powerpoint/2010/main" xmlns="" val="21420202"/>
+        <p14:creationId xmlns="" xmlns:p14="http://schemas.microsoft.com/office/powerpoint/2010/main" val="21420202"/>
       </p:ext>
     </p:extLst>
   </p:cSld>
@@ -782,7 +782,7 @@
             <a:fld id="{E90F2C70-D7C5-4A11-BAB2-648D55629A91}" type="datetimeFigureOut">
               <a:rPr lang="fr-FR" smtClean="0"/>
               <a:pPr/>
-              <a:t>17/11/2017</a:t>
+              <a:t>20/11/2017</a:t>
             </a:fld>
             <a:endParaRPr lang="fr-FR"/>
           </a:p>
@@ -834,7 +834,7 @@
     </p:spTree>
     <p:extLst>
       <p:ext uri="{BB962C8B-B14F-4D97-AF65-F5344CB8AC3E}">
-        <p14:creationId xmlns:p14="http://schemas.microsoft.com/office/powerpoint/2010/main" xmlns="" val="1134717922"/>
+        <p14:creationId xmlns="" xmlns:p14="http://schemas.microsoft.com/office/powerpoint/2010/main" val="1134717922"/>
       </p:ext>
     </p:extLst>
   </p:cSld>
@@ -1030,7 +1030,7 @@
             <a:fld id="{E90F2C70-D7C5-4A11-BAB2-648D55629A91}" type="datetimeFigureOut">
               <a:rPr lang="fr-FR" smtClean="0"/>
               <a:pPr/>
-              <a:t>17/11/2017</a:t>
+              <a:t>20/11/2017</a:t>
             </a:fld>
             <a:endParaRPr lang="fr-FR"/>
           </a:p>
@@ -1082,7 +1082,7 @@
     </p:spTree>
     <p:extLst>
       <p:ext uri="{BB962C8B-B14F-4D97-AF65-F5344CB8AC3E}">
-        <p14:creationId xmlns:p14="http://schemas.microsoft.com/office/powerpoint/2010/main" xmlns="" val="747376118"/>
+        <p14:creationId xmlns="" xmlns:p14="http://schemas.microsoft.com/office/powerpoint/2010/main" val="747376118"/>
       </p:ext>
     </p:extLst>
   </p:cSld>
@@ -1264,7 +1264,7 @@
             <a:fld id="{E90F2C70-D7C5-4A11-BAB2-648D55629A91}" type="datetimeFigureOut">
               <a:rPr lang="fr-FR" smtClean="0"/>
               <a:pPr/>
-              <a:t>17/11/2017</a:t>
+              <a:t>20/11/2017</a:t>
             </a:fld>
             <a:endParaRPr lang="fr-FR"/>
           </a:p>
@@ -1316,7 +1316,7 @@
     </p:spTree>
     <p:extLst>
       <p:ext uri="{BB962C8B-B14F-4D97-AF65-F5344CB8AC3E}">
-        <p14:creationId xmlns:p14="http://schemas.microsoft.com/office/powerpoint/2010/main" xmlns="" val="2931141288"/>
+        <p14:creationId xmlns="" xmlns:p14="http://schemas.microsoft.com/office/powerpoint/2010/main" val="2931141288"/>
       </p:ext>
     </p:extLst>
   </p:cSld>
@@ -1633,7 +1633,7 @@
             <a:fld id="{E90F2C70-D7C5-4A11-BAB2-648D55629A91}" type="datetimeFigureOut">
               <a:rPr lang="fr-FR" smtClean="0"/>
               <a:pPr/>
-              <a:t>17/11/2017</a:t>
+              <a:t>20/11/2017</a:t>
             </a:fld>
             <a:endParaRPr lang="fr-FR"/>
           </a:p>
@@ -1685,7 +1685,7 @@
     </p:spTree>
     <p:extLst>
       <p:ext uri="{BB962C8B-B14F-4D97-AF65-F5344CB8AC3E}">
-        <p14:creationId xmlns:p14="http://schemas.microsoft.com/office/powerpoint/2010/main" xmlns="" val="3085942919"/>
+        <p14:creationId xmlns="" xmlns:p14="http://schemas.microsoft.com/office/powerpoint/2010/main" val="3085942919"/>
       </p:ext>
     </p:extLst>
   </p:cSld>
@@ -1753,7 +1753,7 @@
             <a:fld id="{E90F2C70-D7C5-4A11-BAB2-648D55629A91}" type="datetimeFigureOut">
               <a:rPr lang="fr-FR" smtClean="0"/>
               <a:pPr/>
-              <a:t>17/11/2017</a:t>
+              <a:t>20/11/2017</a:t>
             </a:fld>
             <a:endParaRPr lang="fr-FR"/>
           </a:p>
@@ -1805,7 +1805,7 @@
     </p:spTree>
     <p:extLst>
       <p:ext uri="{BB962C8B-B14F-4D97-AF65-F5344CB8AC3E}">
-        <p14:creationId xmlns:p14="http://schemas.microsoft.com/office/powerpoint/2010/main" xmlns="" val="2225407022"/>
+        <p14:creationId xmlns="" xmlns:p14="http://schemas.microsoft.com/office/powerpoint/2010/main" val="2225407022"/>
       </p:ext>
     </p:extLst>
   </p:cSld>
@@ -1850,7 +1850,7 @@
             <a:fld id="{E90F2C70-D7C5-4A11-BAB2-648D55629A91}" type="datetimeFigureOut">
               <a:rPr lang="fr-FR" smtClean="0"/>
               <a:pPr/>
-              <a:t>17/11/2017</a:t>
+              <a:t>20/11/2017</a:t>
             </a:fld>
             <a:endParaRPr lang="fr-FR"/>
           </a:p>
@@ -1902,7 +1902,7 @@
     </p:spTree>
     <p:extLst>
       <p:ext uri="{BB962C8B-B14F-4D97-AF65-F5344CB8AC3E}">
-        <p14:creationId xmlns:p14="http://schemas.microsoft.com/office/powerpoint/2010/main" xmlns="" val="3549111699"/>
+        <p14:creationId xmlns="" xmlns:p14="http://schemas.microsoft.com/office/powerpoint/2010/main" val="3549111699"/>
       </p:ext>
     </p:extLst>
   </p:cSld>
@@ -2129,7 +2129,7 @@
             <a:fld id="{E90F2C70-D7C5-4A11-BAB2-648D55629A91}" type="datetimeFigureOut">
               <a:rPr lang="fr-FR" smtClean="0"/>
               <a:pPr/>
-              <a:t>17/11/2017</a:t>
+              <a:t>20/11/2017</a:t>
             </a:fld>
             <a:endParaRPr lang="fr-FR"/>
           </a:p>
@@ -2181,7 +2181,7 @@
     </p:spTree>
     <p:extLst>
       <p:ext uri="{BB962C8B-B14F-4D97-AF65-F5344CB8AC3E}">
-        <p14:creationId xmlns:p14="http://schemas.microsoft.com/office/powerpoint/2010/main" xmlns="" val="1630271679"/>
+        <p14:creationId xmlns="" xmlns:p14="http://schemas.microsoft.com/office/powerpoint/2010/main" val="1630271679"/>
       </p:ext>
     </p:extLst>
   </p:cSld>
@@ -2384,7 +2384,7 @@
             <a:fld id="{E90F2C70-D7C5-4A11-BAB2-648D55629A91}" type="datetimeFigureOut">
               <a:rPr lang="fr-FR" smtClean="0"/>
               <a:pPr/>
-              <a:t>17/11/2017</a:t>
+              <a:t>20/11/2017</a:t>
             </a:fld>
             <a:endParaRPr lang="fr-FR"/>
           </a:p>
@@ -2436,7 +2436,7 @@
     </p:spTree>
     <p:extLst>
       <p:ext uri="{BB962C8B-B14F-4D97-AF65-F5344CB8AC3E}">
-        <p14:creationId xmlns:p14="http://schemas.microsoft.com/office/powerpoint/2010/main" xmlns="" val="1500102834"/>
+        <p14:creationId xmlns="" xmlns:p14="http://schemas.microsoft.com/office/powerpoint/2010/main" val="1500102834"/>
       </p:ext>
     </p:extLst>
   </p:cSld>
@@ -2599,7 +2599,7 @@
             <a:fld id="{E90F2C70-D7C5-4A11-BAB2-648D55629A91}" type="datetimeFigureOut">
               <a:rPr lang="fr-FR" smtClean="0"/>
               <a:pPr/>
-              <a:t>17/11/2017</a:t>
+              <a:t>20/11/2017</a:t>
             </a:fld>
             <a:endParaRPr lang="fr-FR"/>
           </a:p>
@@ -2687,7 +2687,7 @@
     </p:spTree>
     <p:extLst>
       <p:ext uri="{BB962C8B-B14F-4D97-AF65-F5344CB8AC3E}">
-        <p14:creationId xmlns:p14="http://schemas.microsoft.com/office/powerpoint/2010/main" xmlns="" val="344752984"/>
+        <p14:creationId xmlns="" xmlns:p14="http://schemas.microsoft.com/office/powerpoint/2010/main" val="344752984"/>
       </p:ext>
     </p:extLst>
   </p:cSld>
@@ -5034,7 +5034,7 @@
         </p:nvSpPr>
         <p:spPr>
           <a:xfrm>
-            <a:off x="2972170" y="1234752"/>
+            <a:off x="2986238" y="742372"/>
             <a:ext cx="1947071" cy="369332"/>
           </a:xfrm>
           <a:prstGeom prst="rect">
@@ -5150,8 +5150,8 @@
         </p:nvCxnSpPr>
         <p:spPr>
           <a:xfrm>
-            <a:off x="5064076" y="1484417"/>
-            <a:ext cx="495300" cy="0"/>
+            <a:off x="5148484" y="1048309"/>
+            <a:ext cx="478594" cy="189647"/>
           </a:xfrm>
           <a:prstGeom prst="line">
             <a:avLst/>
@@ -5185,8 +5185,8 @@
         </p:nvCxnSpPr>
         <p:spPr>
           <a:xfrm>
-            <a:off x="6421166" y="1517977"/>
-            <a:ext cx="495300" cy="0"/>
+            <a:off x="6421166" y="1532790"/>
+            <a:ext cx="495300" cy="13323"/>
           </a:xfrm>
           <a:prstGeom prst="line">
             <a:avLst/>
@@ -5215,13 +5215,15 @@
       <p:cxnSp>
         <p:nvCxnSpPr>
           <p:cNvPr id="113" name="Connecteur droit 112"/>
-          <p:cNvCxnSpPr/>
+          <p:cNvCxnSpPr>
+            <a:endCxn id="85" idx="0"/>
+          </p:cNvCxnSpPr>
           <p:nvPr/>
         </p:nvCxnSpPr>
         <p:spPr>
-          <a:xfrm>
-            <a:off x="5759130" y="534269"/>
-            <a:ext cx="131708" cy="550392"/>
+          <a:xfrm rot="16200000" flipH="1">
+            <a:off x="5633091" y="716579"/>
+            <a:ext cx="637966" cy="76394"/>
           </a:xfrm>
           <a:prstGeom prst="line">
             <a:avLst/>
@@ -5255,7 +5257,7 @@
         </p:nvCxnSpPr>
         <p:spPr>
           <a:xfrm>
-            <a:off x="5356719" y="951615"/>
+            <a:off x="5539603" y="768731"/>
             <a:ext cx="252036" cy="350204"/>
           </a:xfrm>
           <a:prstGeom prst="line">
@@ -5290,7 +5292,7 @@
         </p:nvSpPr>
         <p:spPr>
           <a:xfrm rot="18693875">
-            <a:off x="5209570" y="754960"/>
+            <a:off x="5392454" y="572076"/>
             <a:ext cx="252968" cy="252968"/>
           </a:xfrm>
           <a:prstGeom prst="ellipse">
@@ -5333,7 +5335,7 @@
         </p:nvSpPr>
         <p:spPr>
           <a:xfrm rot="18693875">
-            <a:off x="5620460" y="358367"/>
+            <a:off x="5775208" y="259891"/>
             <a:ext cx="252968" cy="252968"/>
           </a:xfrm>
           <a:prstGeom prst="ellipse">
@@ -5376,7 +5378,7 @@
         </p:nvSpPr>
         <p:spPr>
           <a:xfrm rot="18693875">
-            <a:off x="4843149" y="1338999"/>
+            <a:off x="4927557" y="902891"/>
             <a:ext cx="252968" cy="252968"/>
           </a:xfrm>
           <a:prstGeom prst="ellipse">
@@ -5419,7 +5421,7 @@
         </p:nvSpPr>
         <p:spPr>
           <a:xfrm>
-            <a:off x="3051544" y="583194"/>
+            <a:off x="3234428" y="329970"/>
             <a:ext cx="2173608" cy="369332"/>
           </a:xfrm>
           <a:prstGeom prst="rect">
@@ -5449,7 +5451,7 @@
         </p:nvSpPr>
         <p:spPr>
           <a:xfrm>
-            <a:off x="4936507" y="-49883"/>
+            <a:off x="4950575" y="-92087"/>
             <a:ext cx="1518877" cy="369332"/>
           </a:xfrm>
           <a:prstGeom prst="rect">
@@ -6189,10 +6191,118 @@
           </a:p>
         </p:txBody>
       </p:sp>
+      <p:cxnSp>
+        <p:nvCxnSpPr>
+          <p:cNvPr id="117" name="Connecteur droit 116"/>
+          <p:cNvCxnSpPr/>
+          <p:nvPr/>
+        </p:nvCxnSpPr>
+        <p:spPr>
+          <a:xfrm>
+            <a:off x="5061728" y="1482069"/>
+            <a:ext cx="483580" cy="22585"/>
+          </a:xfrm>
+          <a:prstGeom prst="line">
+            <a:avLst/>
+          </a:prstGeom>
+          <a:ln>
+            <a:solidFill>
+              <a:schemeClr val="tx1"/>
+            </a:solidFill>
+          </a:ln>
+        </p:spPr>
+        <p:style>
+          <a:lnRef idx="1">
+            <a:schemeClr val="accent1"/>
+          </a:lnRef>
+          <a:fillRef idx="0">
+            <a:schemeClr val="accent1"/>
+          </a:fillRef>
+          <a:effectRef idx="0">
+            <a:schemeClr val="accent1"/>
+          </a:effectRef>
+          <a:fontRef idx="minor">
+            <a:schemeClr val="tx1"/>
+          </a:fontRef>
+        </p:style>
+      </p:cxnSp>
+      <p:sp>
+        <p:nvSpPr>
+          <p:cNvPr id="121" name="Ellipse 120"/>
+          <p:cNvSpPr/>
+          <p:nvPr/>
+        </p:nvSpPr>
+        <p:spPr>
+          <a:xfrm rot="18693875">
+            <a:off x="4840801" y="1336651"/>
+            <a:ext cx="252968" cy="252968"/>
+          </a:xfrm>
+          <a:prstGeom prst="ellipse">
+            <a:avLst/>
+          </a:prstGeom>
+          <a:solidFill>
+            <a:schemeClr val="accent6"/>
+          </a:solidFill>
+        </p:spPr>
+        <p:style>
+          <a:lnRef idx="2">
+            <a:schemeClr val="accent1">
+              <a:shade val="50000"/>
+            </a:schemeClr>
+          </a:lnRef>
+          <a:fillRef idx="1">
+            <a:schemeClr val="accent1"/>
+          </a:fillRef>
+          <a:effectRef idx="0">
+            <a:schemeClr val="accent1"/>
+          </a:effectRef>
+          <a:fontRef idx="minor">
+            <a:schemeClr val="lt1"/>
+          </a:fontRef>
+        </p:style>
+        <p:txBody>
+          <a:bodyPr rtlCol="0" anchor="ctr"/>
+          <a:lstStyle/>
+          <a:p>
+            <a:pPr algn="ctr"/>
+            <a:endParaRPr lang="fr-FR"/>
+          </a:p>
+        </p:txBody>
+      </p:sp>
+      <p:sp>
+        <p:nvSpPr>
+          <p:cNvPr id="149" name="ZoneTexte 148"/>
+          <p:cNvSpPr txBox="1"/>
+          <p:nvPr/>
+        </p:nvSpPr>
+        <p:spPr>
+          <a:xfrm>
+            <a:off x="2632198" y="1260532"/>
+            <a:ext cx="2325380" cy="369332"/>
+          </a:xfrm>
+          <a:prstGeom prst="rect">
+            <a:avLst/>
+          </a:prstGeom>
+          <a:noFill/>
+        </p:spPr>
+        <p:txBody>
+          <a:bodyPr wrap="none" rtlCol="0">
+            <a:spAutoFit/>
+          </a:bodyPr>
+          <a:lstStyle/>
+          <a:p>
+            <a:r>
+              <a:rPr lang="fr-FR" dirty="0" err="1" smtClean="0"/>
+              <a:t>closestPollutionStation</a:t>
+            </a:r>
+            <a:endParaRPr lang="fr-FR" dirty="0" smtClean="0"/>
+          </a:p>
+        </p:txBody>
+      </p:sp>
     </p:spTree>
     <p:extLst>
       <p:ext uri="{BB962C8B-B14F-4D97-AF65-F5344CB8AC3E}">
-        <p14:creationId xmlns:p14="http://schemas.microsoft.com/office/powerpoint/2010/main" xmlns="" val="2636587605"/>
+        <p14:creationId xmlns="" xmlns:p14="http://schemas.microsoft.com/office/powerpoint/2010/main" val="2636587605"/>
       </p:ext>
     </p:extLst>
   </p:cSld>
@@ -6700,19 +6810,11 @@
             </a:r>
             <a:r>
               <a:rPr lang="fr-FR" dirty="0" err="1" smtClean="0"/>
-              <a:t>d</a:t>
-            </a:r>
-            <a:r>
-              <a:rPr lang="fr-FR" dirty="0" err="1" smtClean="0"/>
-              <a:t>ioxide</a:t>
+              <a:t>dioxide</a:t>
             </a:r>
             <a:r>
               <a:rPr lang="fr-FR" dirty="0" smtClean="0"/>
-              <a:t> </a:t>
-            </a:r>
-            <a:r>
-              <a:rPr lang="fr-FR" dirty="0" smtClean="0"/>
-              <a:t>(</a:t>
+              <a:t> (</a:t>
             </a:r>
             <a:r>
               <a:rPr lang="fr-FR" dirty="0" err="1" smtClean="0"/>
@@ -6796,11 +6898,7 @@
             </a:r>
             <a:r>
               <a:rPr lang="fr-FR" dirty="0" smtClean="0"/>
-              <a:t> </a:t>
-            </a:r>
-            <a:r>
-              <a:rPr lang="fr-FR" dirty="0" smtClean="0"/>
-              <a:t>PM10 </a:t>
+              <a:t> PM10 </a:t>
             </a:r>
             <a:r>
               <a:rPr lang="fr-FR" dirty="0"/>
@@ -7094,11 +7192,7 @@
             </a:r>
             <a:r>
               <a:rPr lang="fr-FR" dirty="0" smtClean="0"/>
-              <a:t> </a:t>
-            </a:r>
-            <a:r>
-              <a:rPr lang="fr-FR" dirty="0" smtClean="0"/>
-              <a:t>PM2,5 </a:t>
+              <a:t> PM2,5 </a:t>
             </a:r>
             <a:r>
               <a:rPr lang="fr-FR" dirty="0"/>
@@ -7317,11 +7411,7 @@
             </a:pPr>
             <a:r>
               <a:rPr lang="fr-FR" dirty="0" smtClean="0"/>
-              <a:t>Copper</a:t>
-            </a:r>
-            <a:r>
-              <a:rPr lang="fr-FR" dirty="0" smtClean="0"/>
-              <a:t> </a:t>
+              <a:t>Copper </a:t>
             </a:r>
             <a:r>
               <a:rPr lang="fr-FR" dirty="0"/>
@@ -7639,7 +7729,7 @@
     </p:spTree>
     <p:extLst>
       <p:ext uri="{BB962C8B-B14F-4D97-AF65-F5344CB8AC3E}">
-        <p14:creationId xmlns:p14="http://schemas.microsoft.com/office/powerpoint/2010/main" xmlns="" val="3368504421"/>
+        <p14:creationId xmlns="" xmlns:p14="http://schemas.microsoft.com/office/powerpoint/2010/main" val="3368504421"/>
       </p:ext>
     </p:extLst>
   </p:cSld>
@@ -7904,7 +7994,7 @@
   <a:extraClrSchemeLst/>
   <a:extLst>
     <a:ext uri="{05A4C25C-085E-4340-85A3-A5531E510DB2}">
-      <thm15:themeFamily xmlns:thm15="http://schemas.microsoft.com/office/thememl/2012/main" xmlns="" name="Office Theme" id="{62F939B6-93AF-4DB8-9C6B-D6C7DFDC589F}" vid="{4A3C46E8-61CC-4603-A589-7422A47A8E4A}"/>
+      <thm15:themeFamily xmlns="" xmlns:thm15="http://schemas.microsoft.com/office/thememl/2012/main" name="Office Theme" id="{62F939B6-93AF-4DB8-9C6B-D6C7DFDC589F}" vid="{4A3C46E8-61CC-4603-A589-7422A47A8E4A}"/>
     </a:ext>
   </a:extLst>
 </a:theme>

</xml_diff>

<commit_message>
updates docs + star schema
</commit_message>
<xml_diff>
--- a/df-model/df-model.pptx
+++ b/df-model/df-model.pptx
@@ -107,7 +107,7 @@
   </p:defaultTextStyle>
   <p:extLst>
     <p:ext uri="{EFAFB233-063F-42B5-8137-9DF3F51BA10A}">
-      <p15:sldGuideLst xmlns="" xmlns:p15="http://schemas.microsoft.com/office/powerpoint/2012/main">
+      <p15:sldGuideLst xmlns:p15="http://schemas.microsoft.com/office/powerpoint/2012/main" xmlns="">
         <p15:guide id="1" orient="horz" pos="2160">
           <p15:clr>
             <a:srgbClr val="A4A3A4"/>
@@ -256,7 +256,7 @@
             <a:fld id="{E90F2C70-D7C5-4A11-BAB2-648D55629A91}" type="datetimeFigureOut">
               <a:rPr lang="fr-FR" smtClean="0"/>
               <a:pPr/>
-              <a:t>20/11/2017</a:t>
+              <a:t>21/11/2017</a:t>
             </a:fld>
             <a:endParaRPr lang="fr-FR"/>
           </a:p>
@@ -308,7 +308,7 @@
     </p:spTree>
     <p:extLst>
       <p:ext uri="{BB962C8B-B14F-4D97-AF65-F5344CB8AC3E}">
-        <p14:creationId xmlns="" xmlns:p14="http://schemas.microsoft.com/office/powerpoint/2010/main" val="26437346"/>
+        <p14:creationId xmlns:p14="http://schemas.microsoft.com/office/powerpoint/2010/main" xmlns="" val="26437346"/>
       </p:ext>
     </p:extLst>
   </p:cSld>
@@ -428,7 +428,7 @@
             <a:fld id="{E90F2C70-D7C5-4A11-BAB2-648D55629A91}" type="datetimeFigureOut">
               <a:rPr lang="fr-FR" smtClean="0"/>
               <a:pPr/>
-              <a:t>20/11/2017</a:t>
+              <a:t>21/11/2017</a:t>
             </a:fld>
             <a:endParaRPr lang="fr-FR"/>
           </a:p>
@@ -480,7 +480,7 @@
     </p:spTree>
     <p:extLst>
       <p:ext uri="{BB962C8B-B14F-4D97-AF65-F5344CB8AC3E}">
-        <p14:creationId xmlns="" xmlns:p14="http://schemas.microsoft.com/office/powerpoint/2010/main" val="3002800163"/>
+        <p14:creationId xmlns:p14="http://schemas.microsoft.com/office/powerpoint/2010/main" xmlns="" val="3002800163"/>
       </p:ext>
     </p:extLst>
   </p:cSld>
@@ -610,7 +610,7 @@
             <a:fld id="{E90F2C70-D7C5-4A11-BAB2-648D55629A91}" type="datetimeFigureOut">
               <a:rPr lang="fr-FR" smtClean="0"/>
               <a:pPr/>
-              <a:t>20/11/2017</a:t>
+              <a:t>21/11/2017</a:t>
             </a:fld>
             <a:endParaRPr lang="fr-FR"/>
           </a:p>
@@ -662,7 +662,7 @@
     </p:spTree>
     <p:extLst>
       <p:ext uri="{BB962C8B-B14F-4D97-AF65-F5344CB8AC3E}">
-        <p14:creationId xmlns="" xmlns:p14="http://schemas.microsoft.com/office/powerpoint/2010/main" val="21420202"/>
+        <p14:creationId xmlns:p14="http://schemas.microsoft.com/office/powerpoint/2010/main" xmlns="" val="21420202"/>
       </p:ext>
     </p:extLst>
   </p:cSld>
@@ -782,7 +782,7 @@
             <a:fld id="{E90F2C70-D7C5-4A11-BAB2-648D55629A91}" type="datetimeFigureOut">
               <a:rPr lang="fr-FR" smtClean="0"/>
               <a:pPr/>
-              <a:t>20/11/2017</a:t>
+              <a:t>21/11/2017</a:t>
             </a:fld>
             <a:endParaRPr lang="fr-FR"/>
           </a:p>
@@ -834,7 +834,7 @@
     </p:spTree>
     <p:extLst>
       <p:ext uri="{BB962C8B-B14F-4D97-AF65-F5344CB8AC3E}">
-        <p14:creationId xmlns="" xmlns:p14="http://schemas.microsoft.com/office/powerpoint/2010/main" val="1134717922"/>
+        <p14:creationId xmlns:p14="http://schemas.microsoft.com/office/powerpoint/2010/main" xmlns="" val="1134717922"/>
       </p:ext>
     </p:extLst>
   </p:cSld>
@@ -1030,7 +1030,7 @@
             <a:fld id="{E90F2C70-D7C5-4A11-BAB2-648D55629A91}" type="datetimeFigureOut">
               <a:rPr lang="fr-FR" smtClean="0"/>
               <a:pPr/>
-              <a:t>20/11/2017</a:t>
+              <a:t>21/11/2017</a:t>
             </a:fld>
             <a:endParaRPr lang="fr-FR"/>
           </a:p>
@@ -1082,7 +1082,7 @@
     </p:spTree>
     <p:extLst>
       <p:ext uri="{BB962C8B-B14F-4D97-AF65-F5344CB8AC3E}">
-        <p14:creationId xmlns="" xmlns:p14="http://schemas.microsoft.com/office/powerpoint/2010/main" val="747376118"/>
+        <p14:creationId xmlns:p14="http://schemas.microsoft.com/office/powerpoint/2010/main" xmlns="" val="747376118"/>
       </p:ext>
     </p:extLst>
   </p:cSld>
@@ -1264,7 +1264,7 @@
             <a:fld id="{E90F2C70-D7C5-4A11-BAB2-648D55629A91}" type="datetimeFigureOut">
               <a:rPr lang="fr-FR" smtClean="0"/>
               <a:pPr/>
-              <a:t>20/11/2017</a:t>
+              <a:t>21/11/2017</a:t>
             </a:fld>
             <a:endParaRPr lang="fr-FR"/>
           </a:p>
@@ -1316,7 +1316,7 @@
     </p:spTree>
     <p:extLst>
       <p:ext uri="{BB962C8B-B14F-4D97-AF65-F5344CB8AC3E}">
-        <p14:creationId xmlns="" xmlns:p14="http://schemas.microsoft.com/office/powerpoint/2010/main" val="2931141288"/>
+        <p14:creationId xmlns:p14="http://schemas.microsoft.com/office/powerpoint/2010/main" xmlns="" val="2931141288"/>
       </p:ext>
     </p:extLst>
   </p:cSld>
@@ -1633,7 +1633,7 @@
             <a:fld id="{E90F2C70-D7C5-4A11-BAB2-648D55629A91}" type="datetimeFigureOut">
               <a:rPr lang="fr-FR" smtClean="0"/>
               <a:pPr/>
-              <a:t>20/11/2017</a:t>
+              <a:t>21/11/2017</a:t>
             </a:fld>
             <a:endParaRPr lang="fr-FR"/>
           </a:p>
@@ -1685,7 +1685,7 @@
     </p:spTree>
     <p:extLst>
       <p:ext uri="{BB962C8B-B14F-4D97-AF65-F5344CB8AC3E}">
-        <p14:creationId xmlns="" xmlns:p14="http://schemas.microsoft.com/office/powerpoint/2010/main" val="3085942919"/>
+        <p14:creationId xmlns:p14="http://schemas.microsoft.com/office/powerpoint/2010/main" xmlns="" val="3085942919"/>
       </p:ext>
     </p:extLst>
   </p:cSld>
@@ -1753,7 +1753,7 @@
             <a:fld id="{E90F2C70-D7C5-4A11-BAB2-648D55629A91}" type="datetimeFigureOut">
               <a:rPr lang="fr-FR" smtClean="0"/>
               <a:pPr/>
-              <a:t>20/11/2017</a:t>
+              <a:t>21/11/2017</a:t>
             </a:fld>
             <a:endParaRPr lang="fr-FR"/>
           </a:p>
@@ -1805,7 +1805,7 @@
     </p:spTree>
     <p:extLst>
       <p:ext uri="{BB962C8B-B14F-4D97-AF65-F5344CB8AC3E}">
-        <p14:creationId xmlns="" xmlns:p14="http://schemas.microsoft.com/office/powerpoint/2010/main" val="2225407022"/>
+        <p14:creationId xmlns:p14="http://schemas.microsoft.com/office/powerpoint/2010/main" xmlns="" val="2225407022"/>
       </p:ext>
     </p:extLst>
   </p:cSld>
@@ -1850,7 +1850,7 @@
             <a:fld id="{E90F2C70-D7C5-4A11-BAB2-648D55629A91}" type="datetimeFigureOut">
               <a:rPr lang="fr-FR" smtClean="0"/>
               <a:pPr/>
-              <a:t>20/11/2017</a:t>
+              <a:t>21/11/2017</a:t>
             </a:fld>
             <a:endParaRPr lang="fr-FR"/>
           </a:p>
@@ -1902,7 +1902,7 @@
     </p:spTree>
     <p:extLst>
       <p:ext uri="{BB962C8B-B14F-4D97-AF65-F5344CB8AC3E}">
-        <p14:creationId xmlns="" xmlns:p14="http://schemas.microsoft.com/office/powerpoint/2010/main" val="3549111699"/>
+        <p14:creationId xmlns:p14="http://schemas.microsoft.com/office/powerpoint/2010/main" xmlns="" val="3549111699"/>
       </p:ext>
     </p:extLst>
   </p:cSld>
@@ -2129,7 +2129,7 @@
             <a:fld id="{E90F2C70-D7C5-4A11-BAB2-648D55629A91}" type="datetimeFigureOut">
               <a:rPr lang="fr-FR" smtClean="0"/>
               <a:pPr/>
-              <a:t>20/11/2017</a:t>
+              <a:t>21/11/2017</a:t>
             </a:fld>
             <a:endParaRPr lang="fr-FR"/>
           </a:p>
@@ -2181,7 +2181,7 @@
     </p:spTree>
     <p:extLst>
       <p:ext uri="{BB962C8B-B14F-4D97-AF65-F5344CB8AC3E}">
-        <p14:creationId xmlns="" xmlns:p14="http://schemas.microsoft.com/office/powerpoint/2010/main" val="1630271679"/>
+        <p14:creationId xmlns:p14="http://schemas.microsoft.com/office/powerpoint/2010/main" xmlns="" val="1630271679"/>
       </p:ext>
     </p:extLst>
   </p:cSld>
@@ -2384,7 +2384,7 @@
             <a:fld id="{E90F2C70-D7C5-4A11-BAB2-648D55629A91}" type="datetimeFigureOut">
               <a:rPr lang="fr-FR" smtClean="0"/>
               <a:pPr/>
-              <a:t>20/11/2017</a:t>
+              <a:t>21/11/2017</a:t>
             </a:fld>
             <a:endParaRPr lang="fr-FR"/>
           </a:p>
@@ -2436,7 +2436,7 @@
     </p:spTree>
     <p:extLst>
       <p:ext uri="{BB962C8B-B14F-4D97-AF65-F5344CB8AC3E}">
-        <p14:creationId xmlns="" xmlns:p14="http://schemas.microsoft.com/office/powerpoint/2010/main" val="1500102834"/>
+        <p14:creationId xmlns:p14="http://schemas.microsoft.com/office/powerpoint/2010/main" xmlns="" val="1500102834"/>
       </p:ext>
     </p:extLst>
   </p:cSld>
@@ -2599,7 +2599,7 @@
             <a:fld id="{E90F2C70-D7C5-4A11-BAB2-648D55629A91}" type="datetimeFigureOut">
               <a:rPr lang="fr-FR" smtClean="0"/>
               <a:pPr/>
-              <a:t>20/11/2017</a:t>
+              <a:t>21/11/2017</a:t>
             </a:fld>
             <a:endParaRPr lang="fr-FR"/>
           </a:p>
@@ -2687,7 +2687,7 @@
     </p:spTree>
     <p:extLst>
       <p:ext uri="{BB962C8B-B14F-4D97-AF65-F5344CB8AC3E}">
-        <p14:creationId xmlns="" xmlns:p14="http://schemas.microsoft.com/office/powerpoint/2010/main" val="344752984"/>
+        <p14:creationId xmlns:p14="http://schemas.microsoft.com/office/powerpoint/2010/main" xmlns="" val="344752984"/>
       </p:ext>
     </p:extLst>
   </p:cSld>
@@ -6302,7 +6302,7 @@
     </p:spTree>
     <p:extLst>
       <p:ext uri="{BB962C8B-B14F-4D97-AF65-F5344CB8AC3E}">
-        <p14:creationId xmlns="" xmlns:p14="http://schemas.microsoft.com/office/powerpoint/2010/main" val="2636587605"/>
+        <p14:creationId xmlns:p14="http://schemas.microsoft.com/office/powerpoint/2010/main" xmlns="" val="2636587605"/>
       </p:ext>
     </p:extLst>
   </p:cSld>
@@ -6802,7 +6802,11 @@
             </a:pPr>
             <a:r>
               <a:rPr lang="fr-FR" dirty="0" err="1" smtClean="0"/>
-              <a:t>Nitrogen</a:t>
+              <a:t>n</a:t>
+            </a:r>
+            <a:r>
+              <a:rPr lang="fr-FR" dirty="0" err="1" smtClean="0"/>
+              <a:t>itrogen</a:t>
             </a:r>
             <a:r>
               <a:rPr lang="fr-FR" dirty="0" smtClean="0"/>
@@ -6832,7 +6836,11 @@
             </a:pPr>
             <a:r>
               <a:rPr lang="fr-FR" dirty="0" err="1" smtClean="0"/>
-              <a:t>Nitric</a:t>
+              <a:t>n</a:t>
+            </a:r>
+            <a:r>
+              <a:rPr lang="fr-FR" dirty="0" err="1" smtClean="0"/>
+              <a:t>itric</a:t>
             </a:r>
             <a:r>
               <a:rPr lang="fr-FR" dirty="0" smtClean="0"/>
@@ -6867,7 +6875,15 @@
             </a:pPr>
             <a:r>
               <a:rPr lang="fr-FR" dirty="0"/>
-              <a:t>Ozone (</a:t>
+              <a:t>o</a:t>
+            </a:r>
+            <a:r>
+              <a:rPr lang="fr-FR" dirty="0" smtClean="0"/>
+              <a:t>zone </a:t>
+            </a:r>
+            <a:r>
+              <a:rPr lang="fr-FR" dirty="0"/>
+              <a:t>(</a:t>
             </a:r>
             <a:r>
               <a:rPr lang="fr-FR" dirty="0" err="1"/>
@@ -6886,7 +6902,11 @@
             </a:pPr>
             <a:r>
               <a:rPr lang="fr-FR" dirty="0" err="1" smtClean="0"/>
-              <a:t>Particulate</a:t>
+              <a:t>p</a:t>
+            </a:r>
+            <a:r>
+              <a:rPr lang="fr-FR" dirty="0" err="1" smtClean="0"/>
+              <a:t>articulate</a:t>
             </a:r>
             <a:r>
               <a:rPr lang="fr-FR" dirty="0" smtClean="0"/>
@@ -6921,7 +6941,11 @@
             </a:pPr>
             <a:r>
               <a:rPr lang="fr-FR" dirty="0" err="1" smtClean="0"/>
-              <a:t>Benzene</a:t>
+              <a:t>b</a:t>
+            </a:r>
+            <a:r>
+              <a:rPr lang="fr-FR" dirty="0" err="1" smtClean="0"/>
+              <a:t>enzene</a:t>
             </a:r>
             <a:r>
               <a:rPr lang="fr-FR" dirty="0" smtClean="0"/>
@@ -6947,8 +6971,16 @@
               <a:buChar char="•"/>
             </a:pPr>
             <a:r>
+              <a:rPr lang="fr-FR" dirty="0" err="1" smtClean="0"/>
+              <a:t>b</a:t>
+            </a:r>
+            <a:r>
+              <a:rPr lang="fr-FR" dirty="0" err="1" smtClean="0"/>
+              <a:t>enz</a:t>
+            </a:r>
+            <a:r>
               <a:rPr lang="fr-FR" dirty="0" smtClean="0"/>
-              <a:t>Benz(a)</a:t>
+              <a:t>(a)</a:t>
             </a:r>
             <a:r>
               <a:rPr lang="fr-FR" dirty="0" err="1" smtClean="0"/>
@@ -6978,8 +7010,16 @@
               <a:buChar char="•"/>
             </a:pPr>
             <a:r>
+              <a:rPr lang="fr-FR" dirty="0" err="1" smtClean="0"/>
+              <a:t>b</a:t>
+            </a:r>
+            <a:r>
+              <a:rPr lang="fr-FR" dirty="0" err="1" smtClean="0"/>
+              <a:t>enz</a:t>
+            </a:r>
+            <a:r>
               <a:rPr lang="fr-FR" dirty="0" smtClean="0"/>
-              <a:t>Benz(a)</a:t>
+              <a:t>(a)</a:t>
             </a:r>
             <a:r>
               <a:rPr lang="fr-FR" dirty="0" err="1" smtClean="0"/>
@@ -7009,8 +7049,16 @@
               <a:buChar char="•"/>
             </a:pPr>
             <a:r>
+              <a:rPr lang="fr-FR" dirty="0" err="1" smtClean="0"/>
+              <a:t>b</a:t>
+            </a:r>
+            <a:r>
+              <a:rPr lang="fr-FR" dirty="0" err="1" smtClean="0"/>
+              <a:t>enz</a:t>
+            </a:r>
+            <a:r>
               <a:rPr lang="fr-FR" dirty="0" smtClean="0"/>
-              <a:t>Benz(b)</a:t>
+              <a:t>(b)</a:t>
             </a:r>
             <a:r>
               <a:rPr lang="fr-FR" dirty="0" err="1" smtClean="0"/>
@@ -7039,8 +7087,16 @@
               <a:buChar char="•"/>
             </a:pPr>
             <a:r>
+              <a:rPr lang="fr-FR" dirty="0" err="1" smtClean="0"/>
+              <a:t>b</a:t>
+            </a:r>
+            <a:r>
+              <a:rPr lang="fr-FR" dirty="0" err="1" smtClean="0"/>
+              <a:t>enz</a:t>
+            </a:r>
+            <a:r>
               <a:rPr lang="fr-FR" dirty="0" smtClean="0"/>
-              <a:t>Benz(j)</a:t>
+              <a:t>(j)</a:t>
             </a:r>
             <a:r>
               <a:rPr lang="fr-FR" dirty="0" err="1" smtClean="0"/>
@@ -7070,8 +7126,16 @@
               <a:buChar char="•"/>
             </a:pPr>
             <a:r>
+              <a:rPr lang="fr-FR" dirty="0" err="1" smtClean="0"/>
+              <a:t>b</a:t>
+            </a:r>
+            <a:r>
+              <a:rPr lang="fr-FR" dirty="0" err="1" smtClean="0"/>
+              <a:t>enz</a:t>
+            </a:r>
+            <a:r>
               <a:rPr lang="fr-FR" dirty="0" smtClean="0"/>
-              <a:t>Benz(k)</a:t>
+              <a:t>(k)</a:t>
             </a:r>
             <a:r>
               <a:rPr lang="fr-FR" dirty="0" err="1" smtClean="0"/>
@@ -7102,7 +7166,11 @@
             </a:pPr>
             <a:r>
               <a:rPr lang="fr-FR" dirty="0" err="1" smtClean="0"/>
-              <a:t>Dibenzo</a:t>
+              <a:t>d</a:t>
+            </a:r>
+            <a:r>
+              <a:rPr lang="fr-FR" dirty="0" err="1" smtClean="0"/>
+              <a:t>ibenzo</a:t>
             </a:r>
             <a:r>
               <a:rPr lang="fr-FR" dirty="0" smtClean="0"/>
@@ -7144,8 +7212,12 @@
               <a:buChar char="•"/>
             </a:pPr>
             <a:r>
-              <a:rPr lang="fr-FR" smtClean="0"/>
-              <a:t>Indeno</a:t>
+              <a:rPr lang="fr-FR" dirty="0" err="1" smtClean="0"/>
+              <a:t>i</a:t>
+            </a:r>
+            <a:r>
+              <a:rPr lang="fr-FR" dirty="0" err="1" smtClean="0"/>
+              <a:t>ndeno</a:t>
             </a:r>
             <a:r>
               <a:rPr lang="fr-FR" dirty="0" smtClean="0"/>
@@ -7180,7 +7252,11 @@
             </a:pPr>
             <a:r>
               <a:rPr lang="fr-FR" dirty="0" err="1" smtClean="0"/>
-              <a:t>Particulate</a:t>
+              <a:t>p</a:t>
+            </a:r>
+            <a:r>
+              <a:rPr lang="fr-FR" dirty="0" err="1" smtClean="0"/>
+              <a:t>articulate</a:t>
             </a:r>
             <a:r>
               <a:rPr lang="fr-FR" dirty="0" smtClean="0"/>
@@ -7215,7 +7291,11 @@
             </a:pPr>
             <a:r>
               <a:rPr lang="fr-FR" dirty="0" err="1" smtClean="0"/>
-              <a:t>Toluene</a:t>
+              <a:t>t</a:t>
+            </a:r>
+            <a:r>
+              <a:rPr lang="fr-FR" dirty="0" err="1" smtClean="0"/>
+              <a:t>oluene</a:t>
             </a:r>
             <a:r>
               <a:rPr lang="fr-FR" dirty="0" smtClean="0"/>
@@ -7242,7 +7322,11 @@
             </a:pPr>
             <a:r>
               <a:rPr lang="fr-FR" dirty="0" err="1" smtClean="0"/>
-              <a:t>Antimony</a:t>
+              <a:t>a</a:t>
+            </a:r>
+            <a:r>
+              <a:rPr lang="fr-FR" dirty="0" err="1" smtClean="0"/>
+              <a:t>ntimony</a:t>
             </a:r>
             <a:r>
               <a:rPr lang="fr-FR" dirty="0" smtClean="0"/>
@@ -7269,11 +7353,15 @@
             </a:pPr>
             <a:r>
               <a:rPr lang="fr-FR" dirty="0" smtClean="0"/>
-              <a:t>Arsenic</a:t>
+              <a:t>a</a:t>
+            </a:r>
+            <a:r>
+              <a:rPr lang="fr-FR" dirty="0" smtClean="0"/>
+              <a:t>rsenic </a:t>
             </a:r>
             <a:r>
               <a:rPr lang="fr-FR" dirty="0"/>
-              <a:t> (</a:t>
+              <a:t>(</a:t>
             </a:r>
             <a:r>
               <a:rPr lang="fr-FR" dirty="0" err="1"/>
@@ -7296,7 +7384,7 @@
         <p:spPr>
           <a:xfrm>
             <a:off x="6109295" y="894272"/>
-            <a:ext cx="2289666" cy="4524315"/>
+            <a:ext cx="2255489" cy="4524315"/>
           </a:xfrm>
           <a:prstGeom prst="rect">
             <a:avLst/>
@@ -7315,7 +7403,11 @@
             </a:pPr>
             <a:r>
               <a:rPr lang="fr-FR" dirty="0" err="1" smtClean="0"/>
-              <a:t>Barium</a:t>
+              <a:t>b</a:t>
+            </a:r>
+            <a:r>
+              <a:rPr lang="fr-FR" dirty="0" err="1" smtClean="0"/>
+              <a:t>arium</a:t>
             </a:r>
             <a:r>
               <a:rPr lang="fr-FR" dirty="0" smtClean="0"/>
@@ -7342,11 +7434,15 @@
             </a:pPr>
             <a:r>
               <a:rPr lang="fr-FR" dirty="0" smtClean="0"/>
-              <a:t>Cadmium</a:t>
+              <a:t>c</a:t>
+            </a:r>
+            <a:r>
+              <a:rPr lang="fr-FR" dirty="0" smtClean="0"/>
+              <a:t>admium </a:t>
             </a:r>
             <a:r>
               <a:rPr lang="fr-FR" dirty="0"/>
-              <a:t> (</a:t>
+              <a:t>(</a:t>
             </a:r>
             <a:r>
               <a:rPr lang="fr-FR" dirty="0" err="1"/>
@@ -7365,11 +7461,15 @@
             </a:pPr>
             <a:r>
               <a:rPr lang="fr-FR" dirty="0" smtClean="0"/>
-              <a:t>Chrome</a:t>
+              <a:t>c</a:t>
+            </a:r>
+            <a:r>
+              <a:rPr lang="fr-FR" dirty="0" smtClean="0"/>
+              <a:t>hrome </a:t>
             </a:r>
             <a:r>
               <a:rPr lang="fr-FR" dirty="0"/>
-              <a:t> (</a:t>
+              <a:t>(</a:t>
             </a:r>
             <a:r>
               <a:rPr lang="fr-FR" dirty="0" err="1"/>
@@ -7388,11 +7488,15 @@
             </a:pPr>
             <a:r>
               <a:rPr lang="fr-FR" dirty="0" smtClean="0"/>
-              <a:t>Cobalt</a:t>
+              <a:t>c</a:t>
+            </a:r>
+            <a:r>
+              <a:rPr lang="fr-FR" dirty="0" smtClean="0"/>
+              <a:t>obalt </a:t>
             </a:r>
             <a:r>
               <a:rPr lang="fr-FR" dirty="0"/>
-              <a:t> (</a:t>
+              <a:t>(</a:t>
             </a:r>
             <a:r>
               <a:rPr lang="fr-FR" dirty="0" err="1"/>
@@ -7410,8 +7514,16 @@
               <a:buChar char="•"/>
             </a:pPr>
             <a:r>
+              <a:rPr lang="fr-FR" dirty="0" err="1" smtClean="0"/>
+              <a:t>c</a:t>
+            </a:r>
+            <a:r>
+              <a:rPr lang="fr-FR" dirty="0" err="1" smtClean="0"/>
+              <a:t>opper</a:t>
+            </a:r>
+            <a:r>
               <a:rPr lang="fr-FR" dirty="0" smtClean="0"/>
-              <a:t>Copper </a:t>
+              <a:t> </a:t>
             </a:r>
             <a:r>
               <a:rPr lang="fr-FR" dirty="0"/>
@@ -7434,7 +7546,11 @@
             </a:pPr>
             <a:r>
               <a:rPr lang="fr-FR" dirty="0" err="1" smtClean="0"/>
-              <a:t>Sulfur</a:t>
+              <a:t>s</a:t>
+            </a:r>
+            <a:r>
+              <a:rPr lang="fr-FR" dirty="0" err="1" smtClean="0"/>
+              <a:t>ulfur</a:t>
             </a:r>
             <a:r>
               <a:rPr lang="fr-FR" dirty="0" smtClean="0"/>
@@ -7469,7 +7585,11 @@
             </a:pPr>
             <a:r>
               <a:rPr lang="fr-FR" dirty="0" err="1" smtClean="0"/>
-              <a:t>EthylBenzene</a:t>
+              <a:t>e</a:t>
+            </a:r>
+            <a:r>
+              <a:rPr lang="fr-FR" dirty="0" err="1" smtClean="0"/>
+              <a:t>thylBenzene</a:t>
             </a:r>
             <a:r>
               <a:rPr lang="fr-FR" dirty="0" smtClean="0"/>
@@ -7496,7 +7616,11 @@
             </a:pPr>
             <a:r>
               <a:rPr lang="fr-FR" dirty="0" smtClean="0"/>
-              <a:t>M+p-</a:t>
+              <a:t>m</a:t>
+            </a:r>
+            <a:r>
+              <a:rPr lang="fr-FR" dirty="0" smtClean="0"/>
+              <a:t>+p-</a:t>
             </a:r>
             <a:r>
               <a:rPr lang="fr-FR" dirty="0" err="1" smtClean="0"/>
@@ -7527,7 +7651,11 @@
             </a:pPr>
             <a:r>
               <a:rPr lang="fr-FR" dirty="0" err="1" smtClean="0"/>
-              <a:t>Manganese</a:t>
+              <a:t>m</a:t>
+            </a:r>
+            <a:r>
+              <a:rPr lang="fr-FR" dirty="0" err="1" smtClean="0"/>
+              <a:t>anganese</a:t>
             </a:r>
             <a:r>
               <a:rPr lang="fr-FR" dirty="0" smtClean="0"/>
@@ -7554,7 +7682,11 @@
             </a:pPr>
             <a:r>
               <a:rPr lang="fr-FR" dirty="0" err="1" smtClean="0"/>
-              <a:t>Mercury</a:t>
+              <a:t>m</a:t>
+            </a:r>
+            <a:r>
+              <a:rPr lang="fr-FR" dirty="0" err="1" smtClean="0"/>
+              <a:t>ercury</a:t>
             </a:r>
             <a:r>
               <a:rPr lang="fr-FR" dirty="0" smtClean="0"/>
@@ -7581,11 +7713,15 @@
             </a:pPr>
             <a:r>
               <a:rPr lang="fr-FR" dirty="0" smtClean="0"/>
-              <a:t>Nickel</a:t>
+              <a:t>n</a:t>
+            </a:r>
+            <a:r>
+              <a:rPr lang="fr-FR" dirty="0" smtClean="0"/>
+              <a:t>ickel </a:t>
             </a:r>
             <a:r>
               <a:rPr lang="fr-FR" dirty="0"/>
-              <a:t> (</a:t>
+              <a:t>(</a:t>
             </a:r>
             <a:r>
               <a:rPr lang="fr-FR" dirty="0" err="1"/>
@@ -7604,7 +7740,11 @@
             </a:pPr>
             <a:r>
               <a:rPr lang="fr-FR" dirty="0" smtClean="0"/>
-              <a:t>O-</a:t>
+              <a:t>o</a:t>
+            </a:r>
+            <a:r>
+              <a:rPr lang="fr-FR" dirty="0" smtClean="0"/>
+              <a:t>-</a:t>
             </a:r>
             <a:r>
               <a:rPr lang="fr-FR" dirty="0" err="1" smtClean="0"/>
@@ -7635,7 +7775,11 @@
             </a:pPr>
             <a:r>
               <a:rPr lang="fr-FR" dirty="0" err="1" smtClean="0"/>
-              <a:t>Lead</a:t>
+              <a:t>l</a:t>
+            </a:r>
+            <a:r>
+              <a:rPr lang="fr-FR" dirty="0" err="1" smtClean="0"/>
+              <a:t>ead</a:t>
             </a:r>
             <a:r>
               <a:rPr lang="fr-FR" dirty="0" smtClean="0"/>
@@ -7662,11 +7806,15 @@
             </a:pPr>
             <a:r>
               <a:rPr lang="fr-FR" dirty="0" smtClean="0"/>
-              <a:t>Thallium</a:t>
+              <a:t>t</a:t>
+            </a:r>
+            <a:r>
+              <a:rPr lang="fr-FR" dirty="0" smtClean="0"/>
+              <a:t>hallium </a:t>
             </a:r>
             <a:r>
               <a:rPr lang="fr-FR" dirty="0"/>
-              <a:t> (</a:t>
+              <a:t>(</a:t>
             </a:r>
             <a:r>
               <a:rPr lang="fr-FR" dirty="0" err="1"/>
@@ -7685,11 +7833,15 @@
             </a:pPr>
             <a:r>
               <a:rPr lang="fr-FR" dirty="0" smtClean="0"/>
-              <a:t>Vanadium</a:t>
+              <a:t>v</a:t>
+            </a:r>
+            <a:r>
+              <a:rPr lang="fr-FR" dirty="0" smtClean="0"/>
+              <a:t>anadium </a:t>
             </a:r>
             <a:r>
               <a:rPr lang="fr-FR" dirty="0"/>
-              <a:t> (</a:t>
+              <a:t>(</a:t>
             </a:r>
             <a:r>
               <a:rPr lang="fr-FR" dirty="0" err="1"/>
@@ -7708,18 +7860,22 @@
             </a:pPr>
             <a:r>
               <a:rPr lang="fr-FR" dirty="0" smtClean="0"/>
-              <a:t>Zinc</a:t>
+              <a:t>z</a:t>
+            </a:r>
+            <a:r>
+              <a:rPr lang="fr-FR" dirty="0" smtClean="0"/>
+              <a:t>inc </a:t>
             </a:r>
             <a:r>
               <a:rPr lang="fr-FR" dirty="0"/>
-              <a:t> (</a:t>
+              <a:t>(</a:t>
             </a:r>
             <a:r>
               <a:rPr lang="fr-FR" dirty="0" err="1"/>
               <a:t>avg</a:t>
             </a:r>
             <a:r>
-              <a:rPr lang="fr-FR" dirty="0"/>
+              <a:rPr lang="fr-FR" smtClean="0"/>
               <a:t>)</a:t>
             </a:r>
             <a:endParaRPr lang="fr-FR" dirty="0" smtClean="0"/>
@@ -7729,7 +7885,7 @@
     </p:spTree>
     <p:extLst>
       <p:ext uri="{BB962C8B-B14F-4D97-AF65-F5344CB8AC3E}">
-        <p14:creationId xmlns="" xmlns:p14="http://schemas.microsoft.com/office/powerpoint/2010/main" val="3368504421"/>
+        <p14:creationId xmlns:p14="http://schemas.microsoft.com/office/powerpoint/2010/main" xmlns="" val="3368504421"/>
       </p:ext>
     </p:extLst>
   </p:cSld>
@@ -7994,7 +8150,7 @@
   <a:extraClrSchemeLst/>
   <a:extLst>
     <a:ext uri="{05A4C25C-085E-4340-85A3-A5531E510DB2}">
-      <thm15:themeFamily xmlns="" xmlns:thm15="http://schemas.microsoft.com/office/thememl/2012/main" name="Office Theme" id="{62F939B6-93AF-4DB8-9C6B-D6C7DFDC589F}" vid="{4A3C46E8-61CC-4603-A589-7422A47A8E4A}"/>
+      <thm15:themeFamily xmlns:thm15="http://schemas.microsoft.com/office/thememl/2012/main" xmlns="" name="Office Theme" id="{62F939B6-93AF-4DB8-9C6B-D6C7DFDC589F}" vid="{4A3C46E8-61CC-4603-A589-7422A47A8E4A}"/>
     </a:ext>
   </a:extLst>
 </a:theme>

</xml_diff>

<commit_message>
Add relational schema and update df model
</commit_message>
<xml_diff>
--- a/df-model/df-model.pptx
+++ b/df-model/df-model.pptx
@@ -259,7 +259,7 @@
             <a:fld id="{E90F2C70-D7C5-4A11-BAB2-648D55629A91}" type="datetimeFigureOut">
               <a:rPr lang="fr-FR" smtClean="0"/>
               <a:pPr/>
-              <a:t>07/12/2017</a:t>
+              <a:t>12/12/2017</a:t>
             </a:fld>
             <a:endParaRPr lang="fr-FR"/>
           </a:p>
@@ -429,7 +429,7 @@
             <a:fld id="{E90F2C70-D7C5-4A11-BAB2-648D55629A91}" type="datetimeFigureOut">
               <a:rPr lang="fr-FR" smtClean="0"/>
               <a:pPr/>
-              <a:t>07/12/2017</a:t>
+              <a:t>12/12/2017</a:t>
             </a:fld>
             <a:endParaRPr lang="fr-FR"/>
           </a:p>
@@ -609,7 +609,7 @@
             <a:fld id="{E90F2C70-D7C5-4A11-BAB2-648D55629A91}" type="datetimeFigureOut">
               <a:rPr lang="fr-FR" smtClean="0"/>
               <a:pPr/>
-              <a:t>07/12/2017</a:t>
+              <a:t>12/12/2017</a:t>
             </a:fld>
             <a:endParaRPr lang="fr-FR"/>
           </a:p>
@@ -779,7 +779,7 @@
             <a:fld id="{E90F2C70-D7C5-4A11-BAB2-648D55629A91}" type="datetimeFigureOut">
               <a:rPr lang="fr-FR" smtClean="0"/>
               <a:pPr/>
-              <a:t>07/12/2017</a:t>
+              <a:t>12/12/2017</a:t>
             </a:fld>
             <a:endParaRPr lang="fr-FR"/>
           </a:p>
@@ -1026,7 +1026,7 @@
             <a:fld id="{E90F2C70-D7C5-4A11-BAB2-648D55629A91}" type="datetimeFigureOut">
               <a:rPr lang="fr-FR" smtClean="0"/>
               <a:pPr/>
-              <a:t>07/12/2017</a:t>
+              <a:t>12/12/2017</a:t>
             </a:fld>
             <a:endParaRPr lang="fr-FR"/>
           </a:p>
@@ -1257,7 +1257,7 @@
             <a:fld id="{E90F2C70-D7C5-4A11-BAB2-648D55629A91}" type="datetimeFigureOut">
               <a:rPr lang="fr-FR" smtClean="0"/>
               <a:pPr/>
-              <a:t>07/12/2017</a:t>
+              <a:t>12/12/2017</a:t>
             </a:fld>
             <a:endParaRPr lang="fr-FR"/>
           </a:p>
@@ -1623,7 +1623,7 @@
             <a:fld id="{E90F2C70-D7C5-4A11-BAB2-648D55629A91}" type="datetimeFigureOut">
               <a:rPr lang="fr-FR" smtClean="0"/>
               <a:pPr/>
-              <a:t>07/12/2017</a:t>
+              <a:t>12/12/2017</a:t>
             </a:fld>
             <a:endParaRPr lang="fr-FR"/>
           </a:p>
@@ -1742,7 +1742,7 @@
             <a:fld id="{E90F2C70-D7C5-4A11-BAB2-648D55629A91}" type="datetimeFigureOut">
               <a:rPr lang="fr-FR" smtClean="0"/>
               <a:pPr/>
-              <a:t>07/12/2017</a:t>
+              <a:t>12/12/2017</a:t>
             </a:fld>
             <a:endParaRPr lang="fr-FR"/>
           </a:p>
@@ -1839,7 +1839,7 @@
             <a:fld id="{E90F2C70-D7C5-4A11-BAB2-648D55629A91}" type="datetimeFigureOut">
               <a:rPr lang="fr-FR" smtClean="0"/>
               <a:pPr/>
-              <a:t>07/12/2017</a:t>
+              <a:t>12/12/2017</a:t>
             </a:fld>
             <a:endParaRPr lang="fr-FR"/>
           </a:p>
@@ -2116,7 +2116,7 @@
             <a:fld id="{E90F2C70-D7C5-4A11-BAB2-648D55629A91}" type="datetimeFigureOut">
               <a:rPr lang="fr-FR" smtClean="0"/>
               <a:pPr/>
-              <a:t>07/12/2017</a:t>
+              <a:t>12/12/2017</a:t>
             </a:fld>
             <a:endParaRPr lang="fr-FR"/>
           </a:p>
@@ -2370,7 +2370,7 @@
             <a:fld id="{E90F2C70-D7C5-4A11-BAB2-648D55629A91}" type="datetimeFigureOut">
               <a:rPr lang="fr-FR" smtClean="0"/>
               <a:pPr/>
-              <a:t>07/12/2017</a:t>
+              <a:t>12/12/2017</a:t>
             </a:fld>
             <a:endParaRPr lang="fr-FR"/>
           </a:p>
@@ -2583,7 +2583,7 @@
             <a:fld id="{E90F2C70-D7C5-4A11-BAB2-648D55629A91}" type="datetimeFigureOut">
               <a:rPr lang="fr-FR" smtClean="0"/>
               <a:pPr/>
-              <a:t>07/12/2017</a:t>
+              <a:t>12/12/2017</a:t>
             </a:fld>
             <a:endParaRPr lang="fr-FR"/>
           </a:p>
@@ -7828,7 +7828,7 @@
         </p:nvGrpSpPr>
         <p:grpSpPr>
           <a:xfrm>
-            <a:off x="8896945" y="3090446"/>
+            <a:off x="8896945" y="3273326"/>
             <a:ext cx="1001949" cy="704314"/>
             <a:chOff x="8991005" y="3194050"/>
             <a:chExt cx="1001949" cy="704314"/>
@@ -8032,14 +8032,16 @@
             </a:extLst>
           </p:cNvPr>
           <p:cNvCxnSpPr>
+            <a:cxnSpLocks/>
+            <a:stCxn id="5" idx="3"/>
             <a:endCxn id="6" idx="2"/>
           </p:cNvCxnSpPr>
           <p:nvPr/>
         </p:nvCxnSpPr>
         <p:spPr>
           <a:xfrm>
-            <a:off x="8578850" y="3273326"/>
-            <a:ext cx="636190" cy="0"/>
+            <a:off x="8578850" y="3429000"/>
+            <a:ext cx="636190" cy="27206"/>
           </a:xfrm>
           <a:prstGeom prst="line">
             <a:avLst/>
@@ -8080,7 +8082,7 @@
         <p:spPr>
           <a:xfrm flipH="1">
             <a:off x="9580800" y="3273326"/>
-            <a:ext cx="636189" cy="0"/>
+            <a:ext cx="636189" cy="182880"/>
           </a:xfrm>
           <a:prstGeom prst="line">
             <a:avLst/>

</xml_diff>